<commit_message>
Update presentation for applications and next steps
</commit_message>
<xml_diff>
--- a/project_3/ethan-project-3-presentation.pptx
+++ b/project_3/ethan-project-3-presentation.pptx
@@ -5,7 +5,7 @@
     <p:sldMasterId id="2147483777" r:id="rId1"/>
   </p:sldMasterIdLst>
   <p:notesMasterIdLst>
-    <p:notesMasterId r:id="rId14"/>
+    <p:notesMasterId r:id="rId15"/>
   </p:notesMasterIdLst>
   <p:sldIdLst>
     <p:sldId id="256" r:id="rId2"/>
@@ -20,6 +20,7 @@
     <p:sldId id="271" r:id="rId11"/>
     <p:sldId id="272" r:id="rId12"/>
     <p:sldId id="273" r:id="rId13"/>
+    <p:sldId id="275" r:id="rId14"/>
   </p:sldIdLst>
   <p:sldSz cx="12192000" cy="6858000"/>
   <p:notesSz cx="6858000" cy="9144000"/>
@@ -874,6 +875,788 @@
 </file>
 
 <file path=ppt/diagrams/colors2.xml><?xml version="1.0" encoding="utf-8"?>
+<dgm:colorsDef xmlns:dgm="http://schemas.openxmlformats.org/drawingml/2006/diagram" xmlns:a="http://schemas.openxmlformats.org/drawingml/2006/main" uniqueId="urn:microsoft.com/office/officeart/2005/8/colors/colorful5">
+  <dgm:title val=""/>
+  <dgm:desc val=""/>
+  <dgm:catLst>
+    <dgm:cat type="colorful" pri="10500"/>
+  </dgm:catLst>
+  <dgm:styleLbl name="node0">
+    <dgm:fillClrLst meth="repeat">
+      <a:schemeClr val="accent4"/>
+    </dgm:fillClrLst>
+    <dgm:linClrLst meth="repeat">
+      <a:schemeClr val="lt1"/>
+    </dgm:linClrLst>
+    <dgm:effectClrLst/>
+    <dgm:txLinClrLst/>
+    <dgm:txFillClrLst/>
+    <dgm:txEffectClrLst/>
+  </dgm:styleLbl>
+  <dgm:styleLbl name="node1">
+    <dgm:fillClrLst>
+      <a:schemeClr val="accent5"/>
+      <a:schemeClr val="accent6"/>
+    </dgm:fillClrLst>
+    <dgm:linClrLst meth="repeat">
+      <a:schemeClr val="lt1"/>
+    </dgm:linClrLst>
+    <dgm:effectClrLst/>
+    <dgm:txLinClrLst/>
+    <dgm:txFillClrLst/>
+    <dgm:txEffectClrLst/>
+  </dgm:styleLbl>
+  <dgm:styleLbl name="alignNode1">
+    <dgm:fillClrLst>
+      <a:schemeClr val="accent5"/>
+      <a:schemeClr val="accent6"/>
+    </dgm:fillClrLst>
+    <dgm:linClrLst>
+      <a:schemeClr val="accent5"/>
+      <a:schemeClr val="accent6"/>
+    </dgm:linClrLst>
+    <dgm:effectClrLst/>
+    <dgm:txLinClrLst/>
+    <dgm:txFillClrLst/>
+    <dgm:txEffectClrLst/>
+  </dgm:styleLbl>
+  <dgm:styleLbl name="lnNode1">
+    <dgm:fillClrLst>
+      <a:schemeClr val="accent5"/>
+      <a:schemeClr val="accent6"/>
+    </dgm:fillClrLst>
+    <dgm:linClrLst meth="repeat">
+      <a:schemeClr val="lt1"/>
+    </dgm:linClrLst>
+    <dgm:effectClrLst/>
+    <dgm:txLinClrLst/>
+    <dgm:txFillClrLst/>
+    <dgm:txEffectClrLst/>
+  </dgm:styleLbl>
+  <dgm:styleLbl name="vennNode1">
+    <dgm:fillClrLst>
+      <a:schemeClr val="accent5">
+        <a:alpha val="50000"/>
+      </a:schemeClr>
+      <a:schemeClr val="accent6">
+        <a:alpha val="50000"/>
+      </a:schemeClr>
+    </dgm:fillClrLst>
+    <dgm:linClrLst meth="repeat">
+      <a:schemeClr val="lt1"/>
+    </dgm:linClrLst>
+    <dgm:effectClrLst/>
+    <dgm:txLinClrLst/>
+    <dgm:txFillClrLst/>
+    <dgm:txEffectClrLst/>
+  </dgm:styleLbl>
+  <dgm:styleLbl name="node2">
+    <dgm:fillClrLst>
+      <a:schemeClr val="accent6"/>
+    </dgm:fillClrLst>
+    <dgm:linClrLst meth="repeat">
+      <a:schemeClr val="lt1"/>
+    </dgm:linClrLst>
+    <dgm:effectClrLst/>
+    <dgm:txLinClrLst/>
+    <dgm:txFillClrLst/>
+    <dgm:txEffectClrLst/>
+  </dgm:styleLbl>
+  <dgm:styleLbl name="node3">
+    <dgm:fillClrLst>
+      <a:schemeClr val="accent1"/>
+    </dgm:fillClrLst>
+    <dgm:linClrLst meth="repeat">
+      <a:schemeClr val="lt1"/>
+    </dgm:linClrLst>
+    <dgm:effectClrLst/>
+    <dgm:txLinClrLst/>
+    <dgm:txFillClrLst/>
+    <dgm:txEffectClrLst/>
+  </dgm:styleLbl>
+  <dgm:styleLbl name="node4">
+    <dgm:fillClrLst>
+      <a:schemeClr val="accent2"/>
+    </dgm:fillClrLst>
+    <dgm:linClrLst meth="repeat">
+      <a:schemeClr val="lt1"/>
+    </dgm:linClrLst>
+    <dgm:effectClrLst/>
+    <dgm:txLinClrLst/>
+    <dgm:txFillClrLst/>
+    <dgm:txEffectClrLst/>
+  </dgm:styleLbl>
+  <dgm:styleLbl name="fgImgPlace1">
+    <dgm:fillClrLst>
+      <a:schemeClr val="accent5">
+        <a:tint val="50000"/>
+      </a:schemeClr>
+      <a:schemeClr val="accent6">
+        <a:tint val="50000"/>
+      </a:schemeClr>
+    </dgm:fillClrLst>
+    <dgm:linClrLst meth="repeat">
+      <a:schemeClr val="lt1"/>
+    </dgm:linClrLst>
+    <dgm:effectClrLst/>
+    <dgm:txLinClrLst/>
+    <dgm:txFillClrLst meth="repeat">
+      <a:schemeClr val="lt1"/>
+    </dgm:txFillClrLst>
+    <dgm:txEffectClrLst/>
+  </dgm:styleLbl>
+  <dgm:styleLbl name="alignImgPlace1">
+    <dgm:fillClrLst>
+      <a:schemeClr val="accent5">
+        <a:tint val="50000"/>
+      </a:schemeClr>
+      <a:schemeClr val="accent6">
+        <a:tint val="20000"/>
+      </a:schemeClr>
+    </dgm:fillClrLst>
+    <dgm:linClrLst meth="repeat">
+      <a:schemeClr val="lt1"/>
+    </dgm:linClrLst>
+    <dgm:effectClrLst/>
+    <dgm:txLinClrLst/>
+    <dgm:txFillClrLst meth="repeat">
+      <a:schemeClr val="lt1"/>
+    </dgm:txFillClrLst>
+    <dgm:txEffectClrLst/>
+  </dgm:styleLbl>
+  <dgm:styleLbl name="bgImgPlace1">
+    <dgm:fillClrLst>
+      <a:schemeClr val="accent5">
+        <a:tint val="50000"/>
+      </a:schemeClr>
+      <a:schemeClr val="accent6">
+        <a:tint val="20000"/>
+      </a:schemeClr>
+    </dgm:fillClrLst>
+    <dgm:linClrLst meth="repeat">
+      <a:schemeClr val="lt1"/>
+    </dgm:linClrLst>
+    <dgm:effectClrLst/>
+    <dgm:txLinClrLst/>
+    <dgm:txFillClrLst meth="repeat">
+      <a:schemeClr val="lt1"/>
+    </dgm:txFillClrLst>
+    <dgm:txEffectClrLst/>
+  </dgm:styleLbl>
+  <dgm:styleLbl name="sibTrans2D1">
+    <dgm:fillClrLst>
+      <a:schemeClr val="accent5"/>
+      <a:schemeClr val="accent6"/>
+    </dgm:fillClrLst>
+    <dgm:linClrLst meth="repeat">
+      <a:schemeClr val="lt1"/>
+    </dgm:linClrLst>
+    <dgm:effectClrLst/>
+    <dgm:txLinClrLst/>
+    <dgm:txFillClrLst/>
+    <dgm:txEffectClrLst/>
+  </dgm:styleLbl>
+  <dgm:styleLbl name="fgSibTrans2D1">
+    <dgm:fillClrLst>
+      <a:schemeClr val="accent5"/>
+      <a:schemeClr val="accent6"/>
+    </dgm:fillClrLst>
+    <dgm:linClrLst meth="repeat">
+      <a:schemeClr val="lt1"/>
+    </dgm:linClrLst>
+    <dgm:effectClrLst/>
+    <dgm:txLinClrLst/>
+    <dgm:txFillClrLst meth="repeat">
+      <a:schemeClr val="lt1"/>
+    </dgm:txFillClrLst>
+    <dgm:txEffectClrLst/>
+  </dgm:styleLbl>
+  <dgm:styleLbl name="bgSibTrans2D1">
+    <dgm:fillClrLst>
+      <a:schemeClr val="accent5"/>
+      <a:schemeClr val="accent6"/>
+    </dgm:fillClrLst>
+    <dgm:linClrLst meth="repeat">
+      <a:schemeClr val="lt1"/>
+    </dgm:linClrLst>
+    <dgm:effectClrLst/>
+    <dgm:txLinClrLst/>
+    <dgm:txFillClrLst meth="repeat">
+      <a:schemeClr val="lt1"/>
+    </dgm:txFillClrLst>
+    <dgm:txEffectClrLst/>
+  </dgm:styleLbl>
+  <dgm:styleLbl name="sibTrans1D1">
+    <dgm:fillClrLst/>
+    <dgm:linClrLst>
+      <a:schemeClr val="accent5"/>
+      <a:schemeClr val="accent6"/>
+    </dgm:linClrLst>
+    <dgm:effectClrLst/>
+    <dgm:txLinClrLst/>
+    <dgm:txFillClrLst meth="repeat">
+      <a:schemeClr val="tx1"/>
+    </dgm:txFillClrLst>
+    <dgm:txEffectClrLst/>
+  </dgm:styleLbl>
+  <dgm:styleLbl name="callout">
+    <dgm:fillClrLst meth="repeat">
+      <a:schemeClr val="accent5"/>
+    </dgm:fillClrLst>
+    <dgm:linClrLst meth="repeat">
+      <a:schemeClr val="accent5">
+        <a:tint val="50000"/>
+      </a:schemeClr>
+    </dgm:linClrLst>
+    <dgm:effectClrLst/>
+    <dgm:txLinClrLst/>
+    <dgm:txFillClrLst meth="repeat">
+      <a:schemeClr val="tx1"/>
+    </dgm:txFillClrLst>
+    <dgm:txEffectClrLst/>
+  </dgm:styleLbl>
+  <dgm:styleLbl name="asst0">
+    <dgm:fillClrLst meth="repeat">
+      <a:schemeClr val="accent5"/>
+    </dgm:fillClrLst>
+    <dgm:linClrLst meth="repeat">
+      <a:schemeClr val="lt1">
+        <a:shade val="80000"/>
+      </a:schemeClr>
+    </dgm:linClrLst>
+    <dgm:effectClrLst/>
+    <dgm:txLinClrLst/>
+    <dgm:txFillClrLst/>
+    <dgm:txEffectClrLst/>
+  </dgm:styleLbl>
+  <dgm:styleLbl name="asst1">
+    <dgm:fillClrLst meth="repeat">
+      <a:schemeClr val="accent6"/>
+    </dgm:fillClrLst>
+    <dgm:linClrLst meth="repeat">
+      <a:schemeClr val="lt1">
+        <a:shade val="80000"/>
+      </a:schemeClr>
+    </dgm:linClrLst>
+    <dgm:effectClrLst/>
+    <dgm:txLinClrLst/>
+    <dgm:txFillClrLst/>
+    <dgm:txEffectClrLst/>
+  </dgm:styleLbl>
+  <dgm:styleLbl name="asst2">
+    <dgm:fillClrLst>
+      <a:schemeClr val="accent1"/>
+    </dgm:fillClrLst>
+    <dgm:linClrLst meth="repeat">
+      <a:schemeClr val="lt1"/>
+    </dgm:linClrLst>
+    <dgm:effectClrLst/>
+    <dgm:txLinClrLst/>
+    <dgm:txFillClrLst/>
+    <dgm:txEffectClrLst/>
+  </dgm:styleLbl>
+  <dgm:styleLbl name="asst3">
+    <dgm:fillClrLst>
+      <a:schemeClr val="accent2"/>
+    </dgm:fillClrLst>
+    <dgm:linClrLst meth="repeat">
+      <a:schemeClr val="lt1"/>
+    </dgm:linClrLst>
+    <dgm:effectClrLst/>
+    <dgm:txLinClrLst/>
+    <dgm:txFillClrLst/>
+    <dgm:txEffectClrLst/>
+  </dgm:styleLbl>
+  <dgm:styleLbl name="asst4">
+    <dgm:fillClrLst>
+      <a:schemeClr val="accent3"/>
+    </dgm:fillClrLst>
+    <dgm:linClrLst meth="repeat">
+      <a:schemeClr val="lt1"/>
+    </dgm:linClrLst>
+    <dgm:effectClrLst/>
+    <dgm:txLinClrLst/>
+    <dgm:txFillClrLst/>
+    <dgm:txEffectClrLst/>
+  </dgm:styleLbl>
+  <dgm:styleLbl name="parChTrans2D1">
+    <dgm:fillClrLst meth="repeat">
+      <a:schemeClr val="accent5"/>
+    </dgm:fillClrLst>
+    <dgm:linClrLst meth="repeat">
+      <a:schemeClr val="lt1"/>
+    </dgm:linClrLst>
+    <dgm:effectClrLst/>
+    <dgm:txLinClrLst/>
+    <dgm:txFillClrLst meth="repeat">
+      <a:schemeClr val="lt1"/>
+    </dgm:txFillClrLst>
+    <dgm:txEffectClrLst/>
+  </dgm:styleLbl>
+  <dgm:styleLbl name="parChTrans2D2">
+    <dgm:fillClrLst meth="repeat">
+      <a:schemeClr val="accent6"/>
+    </dgm:fillClrLst>
+    <dgm:linClrLst meth="repeat">
+      <a:schemeClr val="lt1"/>
+    </dgm:linClrLst>
+    <dgm:effectClrLst/>
+    <dgm:txLinClrLst/>
+    <dgm:txFillClrLst/>
+    <dgm:txEffectClrLst/>
+  </dgm:styleLbl>
+  <dgm:styleLbl name="parChTrans2D3">
+    <dgm:fillClrLst meth="repeat">
+      <a:schemeClr val="accent6"/>
+    </dgm:fillClrLst>
+    <dgm:linClrLst meth="repeat">
+      <a:schemeClr val="lt1"/>
+    </dgm:linClrLst>
+    <dgm:effectClrLst/>
+    <dgm:txLinClrLst/>
+    <dgm:txFillClrLst/>
+    <dgm:txEffectClrLst/>
+  </dgm:styleLbl>
+  <dgm:styleLbl name="parChTrans2D4">
+    <dgm:fillClrLst meth="repeat">
+      <a:schemeClr val="accent1"/>
+    </dgm:fillClrLst>
+    <dgm:linClrLst meth="repeat">
+      <a:schemeClr val="lt1"/>
+    </dgm:linClrLst>
+    <dgm:effectClrLst/>
+    <dgm:txLinClrLst/>
+    <dgm:txFillClrLst meth="repeat">
+      <a:schemeClr val="lt1"/>
+    </dgm:txFillClrLst>
+    <dgm:txEffectClrLst/>
+  </dgm:styleLbl>
+  <dgm:styleLbl name="parChTrans1D1">
+    <dgm:fillClrLst meth="repeat">
+      <a:schemeClr val="accent5"/>
+    </dgm:fillClrLst>
+    <dgm:linClrLst meth="repeat">
+      <a:schemeClr val="accent5"/>
+    </dgm:linClrLst>
+    <dgm:effectClrLst/>
+    <dgm:txLinClrLst/>
+    <dgm:txFillClrLst meth="repeat">
+      <a:schemeClr val="tx1"/>
+    </dgm:txFillClrLst>
+    <dgm:txEffectClrLst/>
+  </dgm:styleLbl>
+  <dgm:styleLbl name="parChTrans1D2">
+    <dgm:fillClrLst meth="repeat">
+      <a:schemeClr val="accent6">
+        <a:tint val="90000"/>
+      </a:schemeClr>
+    </dgm:fillClrLst>
+    <dgm:linClrLst meth="repeat">
+      <a:schemeClr val="accent6"/>
+    </dgm:linClrLst>
+    <dgm:effectClrLst/>
+    <dgm:txLinClrLst/>
+    <dgm:txFillClrLst meth="repeat">
+      <a:schemeClr val="tx1"/>
+    </dgm:txFillClrLst>
+    <dgm:txEffectClrLst/>
+  </dgm:styleLbl>
+  <dgm:styleLbl name="parChTrans1D3">
+    <dgm:fillClrLst meth="repeat">
+      <a:schemeClr val="accent6">
+        <a:tint val="70000"/>
+      </a:schemeClr>
+    </dgm:fillClrLst>
+    <dgm:linClrLst meth="repeat">
+      <a:schemeClr val="accent1"/>
+    </dgm:linClrLst>
+    <dgm:effectClrLst/>
+    <dgm:txLinClrLst/>
+    <dgm:txFillClrLst meth="repeat">
+      <a:schemeClr val="tx1"/>
+    </dgm:txFillClrLst>
+    <dgm:txEffectClrLst/>
+  </dgm:styleLbl>
+  <dgm:styleLbl name="parChTrans1D4">
+    <dgm:fillClrLst meth="repeat">
+      <a:schemeClr val="accent6">
+        <a:tint val="50000"/>
+      </a:schemeClr>
+    </dgm:fillClrLst>
+    <dgm:linClrLst meth="repeat">
+      <a:schemeClr val="accent2"/>
+    </dgm:linClrLst>
+    <dgm:effectClrLst/>
+    <dgm:txLinClrLst/>
+    <dgm:txFillClrLst meth="repeat">
+      <a:schemeClr val="tx1"/>
+    </dgm:txFillClrLst>
+    <dgm:txEffectClrLst/>
+  </dgm:styleLbl>
+  <dgm:styleLbl name="fgAcc1">
+    <dgm:fillClrLst meth="repeat">
+      <a:schemeClr val="lt1">
+        <a:alpha val="90000"/>
+      </a:schemeClr>
+    </dgm:fillClrLst>
+    <dgm:linClrLst>
+      <a:schemeClr val="accent5"/>
+      <a:schemeClr val="accent6"/>
+    </dgm:linClrLst>
+    <dgm:effectClrLst/>
+    <dgm:txLinClrLst/>
+    <dgm:txFillClrLst meth="repeat">
+      <a:schemeClr val="dk1"/>
+    </dgm:txFillClrLst>
+    <dgm:txEffectClrLst/>
+  </dgm:styleLbl>
+  <dgm:styleLbl name="conFgAcc1">
+    <dgm:fillClrLst meth="repeat">
+      <a:schemeClr val="lt1">
+        <a:alpha val="90000"/>
+      </a:schemeClr>
+    </dgm:fillClrLst>
+    <dgm:linClrLst>
+      <a:schemeClr val="accent5"/>
+      <a:schemeClr val="accent6"/>
+    </dgm:linClrLst>
+    <dgm:effectClrLst/>
+    <dgm:txLinClrLst/>
+    <dgm:txFillClrLst meth="repeat">
+      <a:schemeClr val="dk1"/>
+    </dgm:txFillClrLst>
+    <dgm:txEffectClrLst/>
+  </dgm:styleLbl>
+  <dgm:styleLbl name="alignAcc1">
+    <dgm:fillClrLst meth="repeat">
+      <a:schemeClr val="lt1">
+        <a:alpha val="90000"/>
+      </a:schemeClr>
+    </dgm:fillClrLst>
+    <dgm:linClrLst>
+      <a:schemeClr val="accent5"/>
+      <a:schemeClr val="accent6"/>
+    </dgm:linClrLst>
+    <dgm:effectClrLst/>
+    <dgm:txLinClrLst/>
+    <dgm:txFillClrLst meth="repeat">
+      <a:schemeClr val="dk1"/>
+    </dgm:txFillClrLst>
+    <dgm:txEffectClrLst/>
+  </dgm:styleLbl>
+  <dgm:styleLbl name="trAlignAcc1">
+    <dgm:fillClrLst meth="repeat">
+      <a:schemeClr val="lt1">
+        <a:alpha val="40000"/>
+      </a:schemeClr>
+    </dgm:fillClrLst>
+    <dgm:linClrLst meth="repeat">
+      <a:schemeClr val="accent5"/>
+    </dgm:linClrLst>
+    <dgm:effectClrLst/>
+    <dgm:txLinClrLst/>
+    <dgm:txFillClrLst meth="repeat">
+      <a:schemeClr val="dk1"/>
+    </dgm:txFillClrLst>
+    <dgm:txEffectClrLst/>
+  </dgm:styleLbl>
+  <dgm:styleLbl name="bgAcc1">
+    <dgm:fillClrLst meth="repeat">
+      <a:schemeClr val="lt1">
+        <a:alpha val="90000"/>
+      </a:schemeClr>
+    </dgm:fillClrLst>
+    <dgm:linClrLst>
+      <a:schemeClr val="accent5"/>
+      <a:schemeClr val="accent6"/>
+    </dgm:linClrLst>
+    <dgm:effectClrLst/>
+    <dgm:txLinClrLst/>
+    <dgm:txFillClrLst meth="repeat">
+      <a:schemeClr val="dk1"/>
+    </dgm:txFillClrLst>
+    <dgm:txEffectClrLst/>
+  </dgm:styleLbl>
+  <dgm:styleLbl name="solidFgAcc1">
+    <dgm:fillClrLst meth="repeat">
+      <a:schemeClr val="lt1"/>
+    </dgm:fillClrLst>
+    <dgm:linClrLst>
+      <a:schemeClr val="accent5"/>
+      <a:schemeClr val="accent6"/>
+    </dgm:linClrLst>
+    <dgm:effectClrLst/>
+    <dgm:txLinClrLst/>
+    <dgm:txFillClrLst meth="repeat">
+      <a:schemeClr val="dk1"/>
+    </dgm:txFillClrLst>
+    <dgm:txEffectClrLst/>
+  </dgm:styleLbl>
+  <dgm:styleLbl name="solidAlignAcc1">
+    <dgm:fillClrLst meth="repeat">
+      <a:schemeClr val="lt1"/>
+    </dgm:fillClrLst>
+    <dgm:linClrLst>
+      <a:schemeClr val="accent5"/>
+      <a:schemeClr val="accent6"/>
+    </dgm:linClrLst>
+    <dgm:effectClrLst/>
+    <dgm:txLinClrLst/>
+    <dgm:txFillClrLst meth="repeat">
+      <a:schemeClr val="dk1"/>
+    </dgm:txFillClrLst>
+    <dgm:txEffectClrLst/>
+  </dgm:styleLbl>
+  <dgm:styleLbl name="solidBgAcc1">
+    <dgm:fillClrLst meth="repeat">
+      <a:schemeClr val="lt1"/>
+    </dgm:fillClrLst>
+    <dgm:linClrLst>
+      <a:schemeClr val="accent5"/>
+      <a:schemeClr val="accent6"/>
+    </dgm:linClrLst>
+    <dgm:effectClrLst/>
+    <dgm:txLinClrLst/>
+    <dgm:txFillClrLst meth="repeat">
+      <a:schemeClr val="dk1"/>
+    </dgm:txFillClrLst>
+    <dgm:txEffectClrLst/>
+  </dgm:styleLbl>
+  <dgm:styleLbl name="fgAccFollowNode1">
+    <dgm:fillClrLst>
+      <a:schemeClr val="accent5">
+        <a:tint val="40000"/>
+        <a:alpha val="90000"/>
+      </a:schemeClr>
+      <a:schemeClr val="accent6">
+        <a:tint val="40000"/>
+        <a:alpha val="90000"/>
+      </a:schemeClr>
+    </dgm:fillClrLst>
+    <dgm:linClrLst>
+      <a:schemeClr val="accent5">
+        <a:tint val="40000"/>
+        <a:alpha val="90000"/>
+      </a:schemeClr>
+      <a:schemeClr val="accent5">
+        <a:tint val="40000"/>
+        <a:alpha val="90000"/>
+      </a:schemeClr>
+    </dgm:linClrLst>
+    <dgm:effectClrLst/>
+    <dgm:txLinClrLst/>
+    <dgm:txFillClrLst meth="repeat">
+      <a:schemeClr val="dk1"/>
+    </dgm:txFillClrLst>
+    <dgm:txEffectClrLst/>
+  </dgm:styleLbl>
+  <dgm:styleLbl name="alignAccFollowNode1">
+    <dgm:fillClrLst>
+      <a:schemeClr val="accent5">
+        <a:tint val="40000"/>
+        <a:alpha val="90000"/>
+      </a:schemeClr>
+      <a:schemeClr val="accent6">
+        <a:tint val="40000"/>
+        <a:alpha val="90000"/>
+      </a:schemeClr>
+    </dgm:fillClrLst>
+    <dgm:linClrLst>
+      <a:schemeClr val="accent5">
+        <a:tint val="40000"/>
+        <a:alpha val="90000"/>
+      </a:schemeClr>
+      <a:schemeClr val="accent6">
+        <a:tint val="40000"/>
+        <a:alpha val="90000"/>
+      </a:schemeClr>
+    </dgm:linClrLst>
+    <dgm:effectClrLst/>
+    <dgm:txLinClrLst/>
+    <dgm:txFillClrLst meth="repeat">
+      <a:schemeClr val="dk1"/>
+    </dgm:txFillClrLst>
+    <dgm:txEffectClrLst/>
+  </dgm:styleLbl>
+  <dgm:styleLbl name="bgAccFollowNode1">
+    <dgm:fillClrLst>
+      <a:schemeClr val="accent5">
+        <a:tint val="40000"/>
+        <a:alpha val="90000"/>
+      </a:schemeClr>
+      <a:schemeClr val="accent6">
+        <a:tint val="40000"/>
+        <a:alpha val="90000"/>
+      </a:schemeClr>
+    </dgm:fillClrLst>
+    <dgm:linClrLst>
+      <a:schemeClr val="accent5">
+        <a:tint val="40000"/>
+        <a:alpha val="90000"/>
+      </a:schemeClr>
+      <a:schemeClr val="accent6">
+        <a:tint val="40000"/>
+        <a:alpha val="90000"/>
+      </a:schemeClr>
+    </dgm:linClrLst>
+    <dgm:effectClrLst/>
+    <dgm:txLinClrLst/>
+    <dgm:txFillClrLst meth="repeat">
+      <a:schemeClr val="dk1"/>
+    </dgm:txFillClrLst>
+    <dgm:txEffectClrLst/>
+  </dgm:styleLbl>
+  <dgm:styleLbl name="fgAcc0">
+    <dgm:fillClrLst meth="repeat">
+      <a:schemeClr val="lt1">
+        <a:alpha val="90000"/>
+      </a:schemeClr>
+    </dgm:fillClrLst>
+    <dgm:linClrLst>
+      <a:schemeClr val="accent4"/>
+    </dgm:linClrLst>
+    <dgm:effectClrLst/>
+    <dgm:txLinClrLst/>
+    <dgm:txFillClrLst meth="repeat">
+      <a:schemeClr val="dk1"/>
+    </dgm:txFillClrLst>
+    <dgm:txEffectClrLst/>
+  </dgm:styleLbl>
+  <dgm:styleLbl name="fgAcc2">
+    <dgm:fillClrLst meth="repeat">
+      <a:schemeClr val="lt1">
+        <a:alpha val="90000"/>
+      </a:schemeClr>
+    </dgm:fillClrLst>
+    <dgm:linClrLst>
+      <a:schemeClr val="accent6"/>
+    </dgm:linClrLst>
+    <dgm:effectClrLst/>
+    <dgm:txLinClrLst/>
+    <dgm:txFillClrLst meth="repeat">
+      <a:schemeClr val="dk1"/>
+    </dgm:txFillClrLst>
+    <dgm:txEffectClrLst/>
+  </dgm:styleLbl>
+  <dgm:styleLbl name="fgAcc3">
+    <dgm:fillClrLst meth="repeat">
+      <a:schemeClr val="lt1">
+        <a:alpha val="90000"/>
+      </a:schemeClr>
+    </dgm:fillClrLst>
+    <dgm:linClrLst>
+      <a:schemeClr val="accent1"/>
+    </dgm:linClrLst>
+    <dgm:effectClrLst/>
+    <dgm:txLinClrLst/>
+    <dgm:txFillClrLst meth="repeat">
+      <a:schemeClr val="dk1"/>
+    </dgm:txFillClrLst>
+    <dgm:txEffectClrLst/>
+  </dgm:styleLbl>
+  <dgm:styleLbl name="fgAcc4">
+    <dgm:fillClrLst meth="repeat">
+      <a:schemeClr val="lt1">
+        <a:alpha val="90000"/>
+      </a:schemeClr>
+    </dgm:fillClrLst>
+    <dgm:linClrLst>
+      <a:schemeClr val="accent2"/>
+    </dgm:linClrLst>
+    <dgm:effectClrLst/>
+    <dgm:txLinClrLst/>
+    <dgm:txFillClrLst meth="repeat">
+      <a:schemeClr val="dk1"/>
+    </dgm:txFillClrLst>
+    <dgm:txEffectClrLst/>
+  </dgm:styleLbl>
+  <dgm:styleLbl name="bgShp">
+    <dgm:fillClrLst meth="repeat">
+      <a:schemeClr val="accent5">
+        <a:tint val="40000"/>
+      </a:schemeClr>
+    </dgm:fillClrLst>
+    <dgm:linClrLst meth="repeat">
+      <a:schemeClr val="dk1"/>
+    </dgm:linClrLst>
+    <dgm:effectClrLst/>
+    <dgm:txLinClrLst/>
+    <dgm:txFillClrLst meth="repeat">
+      <a:schemeClr val="dk1"/>
+    </dgm:txFillClrLst>
+    <dgm:txEffectClrLst/>
+  </dgm:styleLbl>
+  <dgm:styleLbl name="dkBgShp">
+    <dgm:fillClrLst meth="repeat">
+      <a:schemeClr val="accent5">
+        <a:shade val="90000"/>
+      </a:schemeClr>
+    </dgm:fillClrLst>
+    <dgm:linClrLst meth="repeat">
+      <a:schemeClr val="dk1"/>
+    </dgm:linClrLst>
+    <dgm:effectClrLst/>
+    <dgm:txLinClrLst/>
+    <dgm:txFillClrLst meth="repeat">
+      <a:schemeClr val="lt1"/>
+    </dgm:txFillClrLst>
+    <dgm:txEffectClrLst/>
+  </dgm:styleLbl>
+  <dgm:styleLbl name="trBgShp">
+    <dgm:fillClrLst meth="repeat">
+      <a:schemeClr val="accent5">
+        <a:tint val="50000"/>
+        <a:alpha val="40000"/>
+      </a:schemeClr>
+    </dgm:fillClrLst>
+    <dgm:linClrLst meth="repeat">
+      <a:schemeClr val="accent5"/>
+    </dgm:linClrLst>
+    <dgm:effectClrLst/>
+    <dgm:txLinClrLst/>
+    <dgm:txFillClrLst meth="repeat">
+      <a:schemeClr val="lt1"/>
+    </dgm:txFillClrLst>
+    <dgm:txEffectClrLst/>
+  </dgm:styleLbl>
+  <dgm:styleLbl name="fgShp">
+    <dgm:fillClrLst meth="repeat">
+      <a:schemeClr val="accent5">
+        <a:tint val="40000"/>
+      </a:schemeClr>
+    </dgm:fillClrLst>
+    <dgm:linClrLst meth="repeat">
+      <a:schemeClr val="lt1"/>
+    </dgm:linClrLst>
+    <dgm:effectClrLst/>
+    <dgm:txLinClrLst/>
+    <dgm:txFillClrLst meth="repeat">
+      <a:schemeClr val="dk1"/>
+    </dgm:txFillClrLst>
+    <dgm:txEffectClrLst/>
+  </dgm:styleLbl>
+  <dgm:styleLbl name="revTx">
+    <dgm:fillClrLst meth="repeat">
+      <a:schemeClr val="lt1">
+        <a:alpha val="0"/>
+      </a:schemeClr>
+    </dgm:fillClrLst>
+    <dgm:linClrLst meth="repeat">
+      <a:schemeClr val="dk1">
+        <a:alpha val="0"/>
+      </a:schemeClr>
+    </dgm:linClrLst>
+    <dgm:effectClrLst/>
+    <dgm:txLinClrLst/>
+    <dgm:txFillClrLst meth="repeat">
+      <a:schemeClr val="tx1"/>
+    </dgm:txFillClrLst>
+    <dgm:txEffectClrLst/>
+  </dgm:styleLbl>
+</dgm:colorsDef>
+</file>
+
+<file path=ppt/diagrams/colors3.xml><?xml version="1.0" encoding="utf-8"?>
 <dgm:colorsDef xmlns:dgm="http://schemas.openxmlformats.org/drawingml/2006/diagram" xmlns:a="http://schemas.openxmlformats.org/drawingml/2006/main" uniqueId="urn:microsoft.com/office/officeart/2005/8/colors/colorful5">
   <dgm:title val=""/>
   <dgm:desc val=""/>
@@ -1987,15 +2770,225 @@
           </a:r>
           <a:r>
             <a:rPr lang="en-US" b="0" i="0" dirty="0"/>
-            <a:t> couldn't outperform Logistic Regression. I can't find any papers online to explain why this is the case, but the old-fashioned person in me instinctively says that </a:t>
+            <a:t> couldn't outperform Logistic Regression. I can't find any papers online to explain why this is the case, but the old-fashioned person in me instinctively says that:</a:t>
           </a:r>
         </a:p>
         <a:p>
           <a:r>
             <a:rPr lang="en-US" b="0" i="0" dirty="0"/>
-            <a:t>	If I can achieve the same results using a simple and easy-to-understand model, we should go for it as it reduces the risks of overfitting and it is easier to dissect the model if things go wrong in future</a:t>
+            <a:t>	If one can achieve the same results using a simple and easy-to-understand model, we should go for it as it reduces the risks of overfitting and it is easier to dissect the model if things go wrong in future</a:t>
           </a:r>
           <a:endParaRPr lang="en-US" dirty="0"/>
+        </a:p>
+      </dgm:t>
+    </dgm:pt>
+    <dgm:pt modelId="{89A2F4D4-8BD7-452B-B393-294CE4A5EA84}" type="parTrans" cxnId="{0C1D8D36-B4A6-42B7-81E3-1185C15C134D}">
+      <dgm:prSet/>
+      <dgm:spPr/>
+      <dgm:t>
+        <a:bodyPr/>
+        <a:lstStyle/>
+        <a:p>
+          <a:endParaRPr lang="en-US"/>
+        </a:p>
+      </dgm:t>
+    </dgm:pt>
+    <dgm:pt modelId="{4083A828-C10E-46B7-BEEB-B9CDC34BD0FC}" type="sibTrans" cxnId="{0C1D8D36-B4A6-42B7-81E3-1185C15C134D}">
+      <dgm:prSet/>
+      <dgm:spPr/>
+      <dgm:t>
+        <a:bodyPr/>
+        <a:lstStyle/>
+        <a:p>
+          <a:endParaRPr lang="en-US"/>
+        </a:p>
+      </dgm:t>
+    </dgm:pt>
+    <dgm:pt modelId="{AE9D200D-CC06-A04E-B6F2-9A1D9716F178}" type="pres">
+      <dgm:prSet presAssocID="{C1C567C6-ED5D-4649-8A82-784E4E6BF39F}" presName="linear" presStyleCnt="0">
+        <dgm:presLayoutVars>
+          <dgm:animLvl val="lvl"/>
+          <dgm:resizeHandles val="exact"/>
+        </dgm:presLayoutVars>
+      </dgm:prSet>
+      <dgm:spPr/>
+    </dgm:pt>
+    <dgm:pt modelId="{3D44632E-86CA-6E40-AC95-832B371B0370}" type="pres">
+      <dgm:prSet presAssocID="{230611DA-9AB6-45EE-9688-B28871D5A88F}" presName="parentText" presStyleLbl="node1" presStyleIdx="0" presStyleCnt="3">
+        <dgm:presLayoutVars>
+          <dgm:chMax val="0"/>
+          <dgm:bulletEnabled val="1"/>
+        </dgm:presLayoutVars>
+      </dgm:prSet>
+      <dgm:spPr/>
+    </dgm:pt>
+    <dgm:pt modelId="{CC9873A8-9A78-9242-9A24-61EA078AAD43}" type="pres">
+      <dgm:prSet presAssocID="{612D8353-9B73-4836-BFE4-B56D713EAE46}" presName="spacer" presStyleCnt="0"/>
+      <dgm:spPr/>
+    </dgm:pt>
+    <dgm:pt modelId="{7A8E9247-0778-E54F-A42D-25B5622D2830}" type="pres">
+      <dgm:prSet presAssocID="{3F5E67ED-89A0-4BB2-B884-7AF50BE14985}" presName="parentText" presStyleLbl="node1" presStyleIdx="1" presStyleCnt="3">
+        <dgm:presLayoutVars>
+          <dgm:chMax val="0"/>
+          <dgm:bulletEnabled val="1"/>
+        </dgm:presLayoutVars>
+      </dgm:prSet>
+      <dgm:spPr/>
+    </dgm:pt>
+    <dgm:pt modelId="{B76BED88-C170-284C-877A-555D072FCA6A}" type="pres">
+      <dgm:prSet presAssocID="{E9B10244-AF9C-4172-A29D-9A922E766CD6}" presName="spacer" presStyleCnt="0"/>
+      <dgm:spPr/>
+    </dgm:pt>
+    <dgm:pt modelId="{B9F69BED-7AE4-6245-A5DE-0D43AD4F5748}" type="pres">
+      <dgm:prSet presAssocID="{67283A79-A55C-4EE0-B94D-61E8A26E0C77}" presName="parentText" presStyleLbl="node1" presStyleIdx="2" presStyleCnt="3">
+        <dgm:presLayoutVars>
+          <dgm:chMax val="0"/>
+          <dgm:bulletEnabled val="1"/>
+        </dgm:presLayoutVars>
+      </dgm:prSet>
+      <dgm:spPr/>
+    </dgm:pt>
+  </dgm:ptLst>
+  <dgm:cxnLst>
+    <dgm:cxn modelId="{5DBA630C-FAB5-499B-9427-EB38A8BF7FD9}" srcId="{C1C567C6-ED5D-4649-8A82-784E4E6BF39F}" destId="{3F5E67ED-89A0-4BB2-B884-7AF50BE14985}" srcOrd="1" destOrd="0" parTransId="{3A162D80-60C7-4AF1-903E-FE14EC7962F7}" sibTransId="{E9B10244-AF9C-4172-A29D-9A922E766CD6}"/>
+    <dgm:cxn modelId="{0C1D8D36-B4A6-42B7-81E3-1185C15C134D}" srcId="{C1C567C6-ED5D-4649-8A82-784E4E6BF39F}" destId="{67283A79-A55C-4EE0-B94D-61E8A26E0C77}" srcOrd="2" destOrd="0" parTransId="{89A2F4D4-8BD7-452B-B393-294CE4A5EA84}" sibTransId="{4083A828-C10E-46B7-BEEB-B9CDC34BD0FC}"/>
+    <dgm:cxn modelId="{1E62DE4F-D987-BC4F-9ED6-65B0584E8048}" type="presOf" srcId="{230611DA-9AB6-45EE-9688-B28871D5A88F}" destId="{3D44632E-86CA-6E40-AC95-832B371B0370}" srcOrd="0" destOrd="0" presId="urn:microsoft.com/office/officeart/2005/8/layout/vList2"/>
+    <dgm:cxn modelId="{15A44184-732F-8947-8857-51893E08E90B}" type="presOf" srcId="{C1C567C6-ED5D-4649-8A82-784E4E6BF39F}" destId="{AE9D200D-CC06-A04E-B6F2-9A1D9716F178}" srcOrd="0" destOrd="0" presId="urn:microsoft.com/office/officeart/2005/8/layout/vList2"/>
+    <dgm:cxn modelId="{6AB6D787-51BA-3D4D-9BDB-7F16B7530D81}" type="presOf" srcId="{3F5E67ED-89A0-4BB2-B884-7AF50BE14985}" destId="{7A8E9247-0778-E54F-A42D-25B5622D2830}" srcOrd="0" destOrd="0" presId="urn:microsoft.com/office/officeart/2005/8/layout/vList2"/>
+    <dgm:cxn modelId="{1029C89C-0187-0641-A5F7-61AD31FE6AD4}" type="presOf" srcId="{67283A79-A55C-4EE0-B94D-61E8A26E0C77}" destId="{B9F69BED-7AE4-6245-A5DE-0D43AD4F5748}" srcOrd="0" destOrd="0" presId="urn:microsoft.com/office/officeart/2005/8/layout/vList2"/>
+    <dgm:cxn modelId="{D0DC23C4-F741-44E3-A9EA-A0BE514BCBC2}" srcId="{C1C567C6-ED5D-4649-8A82-784E4E6BF39F}" destId="{230611DA-9AB6-45EE-9688-B28871D5A88F}" srcOrd="0" destOrd="0" parTransId="{A5E893E1-046A-4364-8C2C-96F4F96C5CAF}" sibTransId="{612D8353-9B73-4836-BFE4-B56D713EAE46}"/>
+    <dgm:cxn modelId="{A948E699-FF58-3747-A66F-2ED62E6B354E}" type="presParOf" srcId="{AE9D200D-CC06-A04E-B6F2-9A1D9716F178}" destId="{3D44632E-86CA-6E40-AC95-832B371B0370}" srcOrd="0" destOrd="0" presId="urn:microsoft.com/office/officeart/2005/8/layout/vList2"/>
+    <dgm:cxn modelId="{AC579D20-8F55-5040-8BBD-2D482C79FE7D}" type="presParOf" srcId="{AE9D200D-CC06-A04E-B6F2-9A1D9716F178}" destId="{CC9873A8-9A78-9242-9A24-61EA078AAD43}" srcOrd="1" destOrd="0" presId="urn:microsoft.com/office/officeart/2005/8/layout/vList2"/>
+    <dgm:cxn modelId="{4A826A0A-5FCB-7B4C-8BA8-E35B11FFB723}" type="presParOf" srcId="{AE9D200D-CC06-A04E-B6F2-9A1D9716F178}" destId="{7A8E9247-0778-E54F-A42D-25B5622D2830}" srcOrd="2" destOrd="0" presId="urn:microsoft.com/office/officeart/2005/8/layout/vList2"/>
+    <dgm:cxn modelId="{347094E7-4CA0-CD4F-9C1F-B053D2C94B7B}" type="presParOf" srcId="{AE9D200D-CC06-A04E-B6F2-9A1D9716F178}" destId="{B76BED88-C170-284C-877A-555D072FCA6A}" srcOrd="3" destOrd="0" presId="urn:microsoft.com/office/officeart/2005/8/layout/vList2"/>
+    <dgm:cxn modelId="{12D493AD-51FD-8542-9AC6-6FCCDAD1F5A6}" type="presParOf" srcId="{AE9D200D-CC06-A04E-B6F2-9A1D9716F178}" destId="{B9F69BED-7AE4-6245-A5DE-0D43AD4F5748}" srcOrd="4" destOrd="0" presId="urn:microsoft.com/office/officeart/2005/8/layout/vList2"/>
+  </dgm:cxnLst>
+  <dgm:bg/>
+  <dgm:whole/>
+  <dgm:extLst>
+    <a:ext uri="http://schemas.microsoft.com/office/drawing/2008/diagram">
+      <dsp:dataModelExt xmlns:dsp="http://schemas.microsoft.com/office/drawing/2008/diagram" relId="rId6" minVer="http://schemas.openxmlformats.org/drawingml/2006/diagram"/>
+    </a:ext>
+  </dgm:extLst>
+</dgm:dataModel>
+</file>
+
+<file path=ppt/diagrams/data3.xml><?xml version="1.0" encoding="utf-8"?>
+<dgm:dataModel xmlns:dgm="http://schemas.openxmlformats.org/drawingml/2006/diagram" xmlns:a="http://schemas.openxmlformats.org/drawingml/2006/main">
+  <dgm:ptLst>
+    <dgm:pt modelId="{C1C567C6-ED5D-4649-8A82-784E4E6BF39F}" type="doc">
+      <dgm:prSet loTypeId="urn:microsoft.com/office/officeart/2005/8/layout/vList2" loCatId="list" qsTypeId="urn:microsoft.com/office/officeart/2005/8/quickstyle/simple1" qsCatId="simple" csTypeId="urn:microsoft.com/office/officeart/2005/8/colors/colorful5" csCatId="colorful" phldr="1"/>
+      <dgm:spPr/>
+      <dgm:t>
+        <a:bodyPr/>
+        <a:lstStyle/>
+        <a:p>
+          <a:endParaRPr lang="en-US"/>
+        </a:p>
+      </dgm:t>
+    </dgm:pt>
+    <dgm:pt modelId="{230611DA-9AB6-45EE-9688-B28871D5A88F}">
+      <dgm:prSet custT="1"/>
+      <dgm:spPr/>
+      <dgm:t>
+        <a:bodyPr/>
+        <a:lstStyle/>
+        <a:p>
+          <a:r>
+            <a:rPr lang="en-US" sz="1800" b="0" i="0" dirty="0"/>
+            <a:t>My model can be made freely available to running ‘newbies’ who can’t decide where to post their training-related questions. There are unintuitive differences between the two subreddit communities that can’t be gleaned by a newcomer at first glance...</a:t>
+          </a:r>
+          <a:endParaRPr lang="en-US" sz="1800" dirty="0"/>
+        </a:p>
+      </dgm:t>
+    </dgm:pt>
+    <dgm:pt modelId="{A5E893E1-046A-4364-8C2C-96F4F96C5CAF}" type="parTrans" cxnId="{D0DC23C4-F741-44E3-A9EA-A0BE514BCBC2}">
+      <dgm:prSet/>
+      <dgm:spPr/>
+      <dgm:t>
+        <a:bodyPr/>
+        <a:lstStyle/>
+        <a:p>
+          <a:endParaRPr lang="en-US"/>
+        </a:p>
+      </dgm:t>
+    </dgm:pt>
+    <dgm:pt modelId="{612D8353-9B73-4836-BFE4-B56D713EAE46}" type="sibTrans" cxnId="{D0DC23C4-F741-44E3-A9EA-A0BE514BCBC2}">
+      <dgm:prSet/>
+      <dgm:spPr/>
+      <dgm:t>
+        <a:bodyPr/>
+        <a:lstStyle/>
+        <a:p>
+          <a:endParaRPr lang="en-US"/>
+        </a:p>
+      </dgm:t>
+    </dgm:pt>
+    <dgm:pt modelId="{3F5E67ED-89A0-4BB2-B884-7AF50BE14985}">
+      <dgm:prSet custT="1"/>
+      <dgm:spPr/>
+      <dgm:t>
+        <a:bodyPr/>
+        <a:lstStyle/>
+        <a:p>
+          <a:r>
+            <a:rPr lang="en-US" sz="1800" b="0" i="0" dirty="0"/>
+            <a:t>For example, r\ultrarunning users like to talk about mountains and trails, while r\</a:t>
+          </a:r>
+          <a:r>
+            <a:rPr lang="en-US" sz="1800" b="0" i="0" dirty="0" err="1"/>
+            <a:t>AdvancedRunning</a:t>
+          </a:r>
+          <a:r>
+            <a:rPr lang="en-US" sz="1800" b="0" i="0" dirty="0"/>
+            <a:t> like to talk about trial (not trail), workout, weight, pace, Nike…</a:t>
+          </a:r>
+          <a:endParaRPr lang="en-US" sz="1800" dirty="0"/>
+        </a:p>
+      </dgm:t>
+    </dgm:pt>
+    <dgm:pt modelId="{3A162D80-60C7-4AF1-903E-FE14EC7962F7}" type="parTrans" cxnId="{5DBA630C-FAB5-499B-9427-EB38A8BF7FD9}">
+      <dgm:prSet/>
+      <dgm:spPr/>
+      <dgm:t>
+        <a:bodyPr/>
+        <a:lstStyle/>
+        <a:p>
+          <a:endParaRPr lang="en-US"/>
+        </a:p>
+      </dgm:t>
+    </dgm:pt>
+    <dgm:pt modelId="{E9B10244-AF9C-4172-A29D-9A922E766CD6}" type="sibTrans" cxnId="{5DBA630C-FAB5-499B-9427-EB38A8BF7FD9}">
+      <dgm:prSet/>
+      <dgm:spPr/>
+      <dgm:t>
+        <a:bodyPr/>
+        <a:lstStyle/>
+        <a:p>
+          <a:endParaRPr lang="en-US"/>
+        </a:p>
+      </dgm:t>
+    </dgm:pt>
+    <dgm:pt modelId="{67283A79-A55C-4EE0-B94D-61E8A26E0C77}">
+      <dgm:prSet custT="1"/>
+      <dgm:spPr/>
+      <dgm:t>
+        <a:bodyPr/>
+        <a:lstStyle/>
+        <a:p>
+          <a:r>
+            <a:rPr lang="en-US" sz="1800" b="0" i="0" dirty="0"/>
+            <a:t>For model improvement, I would like to collect a lot more data to see if a difference can be made. For example, I was a bit disappointed that </a:t>
+          </a:r>
+          <a:r>
+            <a:rPr lang="en-US" sz="1800" b="0" i="0" dirty="0" err="1"/>
+            <a:t>XGBoost</a:t>
+          </a:r>
+          <a:r>
+            <a:rPr lang="en-US" sz="1800" b="0" i="0" dirty="0"/>
+            <a:t> could not outperform Logistic Regression but I was told that boosters are meant to work on very large data sets. </a:t>
+          </a:r>
+          <a:endParaRPr lang="en-US" sz="1800" dirty="0"/>
         </a:p>
       </dgm:t>
     </dgm:pt>
@@ -2614,7 +3607,7 @@
           </a:r>
           <a:r>
             <a:rPr lang="en-US" sz="1300" b="0" i="0" kern="1200" dirty="0"/>
-            <a:t> couldn't outperform Logistic Regression. I can't find any papers online to explain why this is the case, but the old-fashioned person in me instinctively says that </a:t>
+            <a:t> couldn't outperform Logistic Regression. I can't find any papers online to explain why this is the case, but the old-fashioned person in me instinctively says that:</a:t>
           </a:r>
         </a:p>
         <a:p>
@@ -2632,7 +3625,7 @@
           </a:pPr>
           <a:r>
             <a:rPr lang="en-US" sz="1300" b="0" i="0" kern="1200" dirty="0"/>
-            <a:t>	If I can achieve the same results using a simple and easy-to-understand model, we should go for it as it reduces the risks of overfitting and it is easier to dissect the model if things go wrong in future</a:t>
+            <a:t>	If one can achieve the same results using a simple and easy-to-understand model, we should go for it as it reduces the risks of overfitting and it is easier to dissect the model if things go wrong in future</a:t>
           </a:r>
           <a:endParaRPr lang="en-US" sz="1300" kern="1200" dirty="0"/>
         </a:p>
@@ -2640,6 +3633,271 @@
       <dsp:txXfrm>
         <a:off x="85062" y="3746093"/>
         <a:ext cx="6093516" cy="1572371"/>
+      </dsp:txXfrm>
+    </dsp:sp>
+  </dsp:spTree>
+</dsp:drawing>
+</file>
+
+<file path=ppt/diagrams/drawing3.xml><?xml version="1.0" encoding="utf-8"?>
+<dsp:drawing xmlns:dgm="http://schemas.openxmlformats.org/drawingml/2006/diagram" xmlns:dsp="http://schemas.microsoft.com/office/drawing/2008/diagram" xmlns:a="http://schemas.openxmlformats.org/drawingml/2006/main">
+  <dsp:spTree>
+    <dsp:nvGrpSpPr>
+      <dsp:cNvPr id="0" name=""/>
+      <dsp:cNvGrpSpPr/>
+    </dsp:nvGrpSpPr>
+    <dsp:grpSpPr/>
+    <dsp:sp modelId="{3D44632E-86CA-6E40-AC95-832B371B0370}">
+      <dsp:nvSpPr>
+        <dsp:cNvPr id="0" name=""/>
+        <dsp:cNvSpPr/>
+      </dsp:nvSpPr>
+      <dsp:spPr>
+        <a:xfrm>
+          <a:off x="0" y="226606"/>
+          <a:ext cx="6263640" cy="1559025"/>
+        </a:xfrm>
+        <a:prstGeom prst="roundRect">
+          <a:avLst/>
+        </a:prstGeom>
+        <a:solidFill>
+          <a:schemeClr val="accent5">
+            <a:hueOff val="0"/>
+            <a:satOff val="0"/>
+            <a:lumOff val="0"/>
+            <a:alphaOff val="0"/>
+          </a:schemeClr>
+        </a:solidFill>
+        <a:ln w="12700" cap="flat" cmpd="sng" algn="ctr">
+          <a:solidFill>
+            <a:schemeClr val="lt1">
+              <a:hueOff val="0"/>
+              <a:satOff val="0"/>
+              <a:lumOff val="0"/>
+              <a:alphaOff val="0"/>
+            </a:schemeClr>
+          </a:solidFill>
+          <a:prstDash val="solid"/>
+          <a:miter lim="800000"/>
+        </a:ln>
+        <a:effectLst/>
+      </dsp:spPr>
+      <dsp:style>
+        <a:lnRef idx="2">
+          <a:scrgbClr r="0" g="0" b="0"/>
+        </a:lnRef>
+        <a:fillRef idx="1">
+          <a:scrgbClr r="0" g="0" b="0"/>
+        </a:fillRef>
+        <a:effectRef idx="0">
+          <a:scrgbClr r="0" g="0" b="0"/>
+        </a:effectRef>
+        <a:fontRef idx="minor">
+          <a:schemeClr val="lt1"/>
+        </a:fontRef>
+      </dsp:style>
+      <dsp:txBody>
+        <a:bodyPr spcFirstLastPara="0" vert="horz" wrap="square" lIns="68580" tIns="68580" rIns="68580" bIns="68580" numCol="1" spcCol="1270" anchor="ctr" anchorCtr="0">
+          <a:noAutofit/>
+        </a:bodyPr>
+        <a:lstStyle/>
+        <a:p>
+          <a:pPr marL="0" lvl="0" indent="0" algn="l" defTabSz="800100">
+            <a:lnSpc>
+              <a:spcPct val="90000"/>
+            </a:lnSpc>
+            <a:spcBef>
+              <a:spcPct val="0"/>
+            </a:spcBef>
+            <a:spcAft>
+              <a:spcPct val="35000"/>
+            </a:spcAft>
+            <a:buNone/>
+          </a:pPr>
+          <a:r>
+            <a:rPr lang="en-US" sz="1800" b="0" i="0" kern="1200" dirty="0"/>
+            <a:t>My model can be made freely available to running ‘newbies’ who can’t decide where to post their training-related questions. There are unintuitive differences between the two subreddit communities that can’t be gleaned by a newcomer at first glance...</a:t>
+          </a:r>
+          <a:endParaRPr lang="en-US" sz="1800" kern="1200" dirty="0"/>
+        </a:p>
+      </dsp:txBody>
+      <dsp:txXfrm>
+        <a:off x="76105" y="302711"/>
+        <a:ext cx="6111430" cy="1406815"/>
+      </dsp:txXfrm>
+    </dsp:sp>
+    <dsp:sp modelId="{7A8E9247-0778-E54F-A42D-25B5622D2830}">
+      <dsp:nvSpPr>
+        <dsp:cNvPr id="0" name=""/>
+        <dsp:cNvSpPr/>
+      </dsp:nvSpPr>
+      <dsp:spPr>
+        <a:xfrm>
+          <a:off x="0" y="1972831"/>
+          <a:ext cx="6263640" cy="1559025"/>
+        </a:xfrm>
+        <a:prstGeom prst="roundRect">
+          <a:avLst/>
+        </a:prstGeom>
+        <a:solidFill>
+          <a:schemeClr val="accent5">
+            <a:hueOff val="-3379271"/>
+            <a:satOff val="-8710"/>
+            <a:lumOff val="-5883"/>
+            <a:alphaOff val="0"/>
+          </a:schemeClr>
+        </a:solidFill>
+        <a:ln w="12700" cap="flat" cmpd="sng" algn="ctr">
+          <a:solidFill>
+            <a:schemeClr val="lt1">
+              <a:hueOff val="0"/>
+              <a:satOff val="0"/>
+              <a:lumOff val="0"/>
+              <a:alphaOff val="0"/>
+            </a:schemeClr>
+          </a:solidFill>
+          <a:prstDash val="solid"/>
+          <a:miter lim="800000"/>
+        </a:ln>
+        <a:effectLst/>
+      </dsp:spPr>
+      <dsp:style>
+        <a:lnRef idx="2">
+          <a:scrgbClr r="0" g="0" b="0"/>
+        </a:lnRef>
+        <a:fillRef idx="1">
+          <a:scrgbClr r="0" g="0" b="0"/>
+        </a:fillRef>
+        <a:effectRef idx="0">
+          <a:scrgbClr r="0" g="0" b="0"/>
+        </a:effectRef>
+        <a:fontRef idx="minor">
+          <a:schemeClr val="lt1"/>
+        </a:fontRef>
+      </dsp:style>
+      <dsp:txBody>
+        <a:bodyPr spcFirstLastPara="0" vert="horz" wrap="square" lIns="68580" tIns="68580" rIns="68580" bIns="68580" numCol="1" spcCol="1270" anchor="ctr" anchorCtr="0">
+          <a:noAutofit/>
+        </a:bodyPr>
+        <a:lstStyle/>
+        <a:p>
+          <a:pPr marL="0" lvl="0" indent="0" algn="l" defTabSz="800100">
+            <a:lnSpc>
+              <a:spcPct val="90000"/>
+            </a:lnSpc>
+            <a:spcBef>
+              <a:spcPct val="0"/>
+            </a:spcBef>
+            <a:spcAft>
+              <a:spcPct val="35000"/>
+            </a:spcAft>
+            <a:buNone/>
+          </a:pPr>
+          <a:r>
+            <a:rPr lang="en-US" sz="1800" b="0" i="0" kern="1200" dirty="0"/>
+            <a:t>For example, r\ultrarunning users like to talk about mountains and trails, while r\</a:t>
+          </a:r>
+          <a:r>
+            <a:rPr lang="en-US" sz="1800" b="0" i="0" kern="1200" dirty="0" err="1"/>
+            <a:t>AdvancedRunning</a:t>
+          </a:r>
+          <a:r>
+            <a:rPr lang="en-US" sz="1800" b="0" i="0" kern="1200" dirty="0"/>
+            <a:t> like to talk about trial (not trail), workout, weight, pace, Nike…</a:t>
+          </a:r>
+          <a:endParaRPr lang="en-US" sz="1800" kern="1200" dirty="0"/>
+        </a:p>
+      </dsp:txBody>
+      <dsp:txXfrm>
+        <a:off x="76105" y="2048936"/>
+        <a:ext cx="6111430" cy="1406815"/>
+      </dsp:txXfrm>
+    </dsp:sp>
+    <dsp:sp modelId="{B9F69BED-7AE4-6245-A5DE-0D43AD4F5748}">
+      <dsp:nvSpPr>
+        <dsp:cNvPr id="0" name=""/>
+        <dsp:cNvSpPr/>
+      </dsp:nvSpPr>
+      <dsp:spPr>
+        <a:xfrm>
+          <a:off x="0" y="3719056"/>
+          <a:ext cx="6263640" cy="1559025"/>
+        </a:xfrm>
+        <a:prstGeom prst="roundRect">
+          <a:avLst/>
+        </a:prstGeom>
+        <a:solidFill>
+          <a:schemeClr val="accent5">
+            <a:hueOff val="-6758543"/>
+            <a:satOff val="-17419"/>
+            <a:lumOff val="-11765"/>
+            <a:alphaOff val="0"/>
+          </a:schemeClr>
+        </a:solidFill>
+        <a:ln w="12700" cap="flat" cmpd="sng" algn="ctr">
+          <a:solidFill>
+            <a:schemeClr val="lt1">
+              <a:hueOff val="0"/>
+              <a:satOff val="0"/>
+              <a:lumOff val="0"/>
+              <a:alphaOff val="0"/>
+            </a:schemeClr>
+          </a:solidFill>
+          <a:prstDash val="solid"/>
+          <a:miter lim="800000"/>
+        </a:ln>
+        <a:effectLst/>
+      </dsp:spPr>
+      <dsp:style>
+        <a:lnRef idx="2">
+          <a:scrgbClr r="0" g="0" b="0"/>
+        </a:lnRef>
+        <a:fillRef idx="1">
+          <a:scrgbClr r="0" g="0" b="0"/>
+        </a:fillRef>
+        <a:effectRef idx="0">
+          <a:scrgbClr r="0" g="0" b="0"/>
+        </a:effectRef>
+        <a:fontRef idx="minor">
+          <a:schemeClr val="lt1"/>
+        </a:fontRef>
+      </dsp:style>
+      <dsp:txBody>
+        <a:bodyPr spcFirstLastPara="0" vert="horz" wrap="square" lIns="68580" tIns="68580" rIns="68580" bIns="68580" numCol="1" spcCol="1270" anchor="ctr" anchorCtr="0">
+          <a:noAutofit/>
+        </a:bodyPr>
+        <a:lstStyle/>
+        <a:p>
+          <a:pPr marL="0" lvl="0" indent="0" algn="l" defTabSz="800100">
+            <a:lnSpc>
+              <a:spcPct val="90000"/>
+            </a:lnSpc>
+            <a:spcBef>
+              <a:spcPct val="0"/>
+            </a:spcBef>
+            <a:spcAft>
+              <a:spcPct val="35000"/>
+            </a:spcAft>
+            <a:buNone/>
+          </a:pPr>
+          <a:r>
+            <a:rPr lang="en-US" sz="1800" b="0" i="0" kern="1200" dirty="0"/>
+            <a:t>For model improvement, I would like to collect a lot more data to see if a difference can be made. For example, I was a bit disappointed that </a:t>
+          </a:r>
+          <a:r>
+            <a:rPr lang="en-US" sz="1800" b="0" i="0" kern="1200" dirty="0" err="1"/>
+            <a:t>XGBoost</a:t>
+          </a:r>
+          <a:r>
+            <a:rPr lang="en-US" sz="1800" b="0" i="0" kern="1200" dirty="0"/>
+            <a:t> could not outperform Logistic Regression but I was told that boosters are meant to work on very large data sets. </a:t>
+          </a:r>
+          <a:endParaRPr lang="en-US" sz="1800" kern="1200" dirty="0"/>
+        </a:p>
+      </dsp:txBody>
+      <dsp:txXfrm>
+        <a:off x="76105" y="3795161"/>
+        <a:ext cx="6111430" cy="1406815"/>
       </dsp:txXfrm>
     </dsp:sp>
   </dsp:spTree>
@@ -3166,6 +4424,173 @@
 </dgm:layoutDef>
 </file>
 
+<file path=ppt/diagrams/layout3.xml><?xml version="1.0" encoding="utf-8"?>
+<dgm:layoutDef xmlns:dgm="http://schemas.openxmlformats.org/drawingml/2006/diagram" xmlns:a="http://schemas.openxmlformats.org/drawingml/2006/main" uniqueId="urn:microsoft.com/office/officeart/2005/8/layout/vList2">
+  <dgm:title val=""/>
+  <dgm:desc val=""/>
+  <dgm:catLst>
+    <dgm:cat type="list" pri="3000"/>
+    <dgm:cat type="convert" pri="1000"/>
+  </dgm:catLst>
+  <dgm:sampData>
+    <dgm:dataModel>
+      <dgm:ptLst>
+        <dgm:pt modelId="0" type="doc"/>
+        <dgm:pt modelId="1">
+          <dgm:prSet phldr="1"/>
+        </dgm:pt>
+        <dgm:pt modelId="11">
+          <dgm:prSet phldr="1"/>
+        </dgm:pt>
+        <dgm:pt modelId="2">
+          <dgm:prSet phldr="1"/>
+        </dgm:pt>
+        <dgm:pt modelId="21">
+          <dgm:prSet phldr="1"/>
+        </dgm:pt>
+      </dgm:ptLst>
+      <dgm:cxnLst>
+        <dgm:cxn modelId="4" srcId="0" destId="1" srcOrd="0" destOrd="0"/>
+        <dgm:cxn modelId="5" srcId="0" destId="2" srcOrd="1" destOrd="0"/>
+        <dgm:cxn modelId="12" srcId="1" destId="11" srcOrd="0" destOrd="0"/>
+        <dgm:cxn modelId="23" srcId="2" destId="21" srcOrd="0" destOrd="0"/>
+      </dgm:cxnLst>
+      <dgm:bg/>
+      <dgm:whole/>
+    </dgm:dataModel>
+  </dgm:sampData>
+  <dgm:styleData>
+    <dgm:dataModel>
+      <dgm:ptLst>
+        <dgm:pt modelId="0" type="doc"/>
+        <dgm:pt modelId="1"/>
+        <dgm:pt modelId="2"/>
+      </dgm:ptLst>
+      <dgm:cxnLst>
+        <dgm:cxn modelId="3" srcId="0" destId="1" srcOrd="0" destOrd="0"/>
+        <dgm:cxn modelId="4" srcId="0" destId="2" srcOrd="1" destOrd="0"/>
+      </dgm:cxnLst>
+      <dgm:bg/>
+      <dgm:whole/>
+    </dgm:dataModel>
+  </dgm:styleData>
+  <dgm:clrData>
+    <dgm:dataModel>
+      <dgm:ptLst>
+        <dgm:pt modelId="0" type="doc"/>
+        <dgm:pt modelId="1"/>
+        <dgm:pt modelId="2"/>
+        <dgm:pt modelId="3"/>
+        <dgm:pt modelId="4"/>
+      </dgm:ptLst>
+      <dgm:cxnLst>
+        <dgm:cxn modelId="5" srcId="0" destId="1" srcOrd="0" destOrd="0"/>
+        <dgm:cxn modelId="6" srcId="0" destId="2" srcOrd="1" destOrd="0"/>
+        <dgm:cxn modelId="7" srcId="0" destId="3" srcOrd="2" destOrd="0"/>
+        <dgm:cxn modelId="8" srcId="0" destId="4" srcOrd="3" destOrd="0"/>
+      </dgm:cxnLst>
+      <dgm:bg/>
+      <dgm:whole/>
+    </dgm:dataModel>
+  </dgm:clrData>
+  <dgm:layoutNode name="linear">
+    <dgm:varLst>
+      <dgm:animLvl val="lvl"/>
+      <dgm:resizeHandles val="exact"/>
+    </dgm:varLst>
+    <dgm:alg type="lin">
+      <dgm:param type="linDir" val="fromT"/>
+      <dgm:param type="vertAlign" val="mid"/>
+    </dgm:alg>
+    <dgm:shape xmlns:r="http://schemas.openxmlformats.org/officeDocument/2006/relationships" r:blip="">
+      <dgm:adjLst/>
+    </dgm:shape>
+    <dgm:presOf/>
+    <dgm:constrLst>
+      <dgm:constr type="w" for="ch" forName="parentText" refType="w"/>
+      <dgm:constr type="h" for="ch" forName="parentText" refType="primFontSz" refFor="ch" refForName="parentText" fact="0.52"/>
+      <dgm:constr type="w" for="ch" forName="childText" refType="w"/>
+      <dgm:constr type="h" for="ch" forName="childText" refType="primFontSz" refFor="ch" refForName="parentText" fact="0.46"/>
+      <dgm:constr type="h" for="ch" forName="parentText" op="equ"/>
+      <dgm:constr type="primFontSz" for="ch" forName="parentText" op="equ" val="65"/>
+      <dgm:constr type="primFontSz" for="ch" forName="childText" refType="primFontSz" refFor="ch" refForName="parentText" op="equ"/>
+      <dgm:constr type="h" for="ch" forName="spacer" refType="primFontSz" refFor="ch" refForName="parentText" fact="0.08"/>
+    </dgm:constrLst>
+    <dgm:ruleLst>
+      <dgm:rule type="primFontSz" for="ch" forName="parentText" val="5" fact="NaN" max="NaN"/>
+    </dgm:ruleLst>
+    <dgm:forEach name="Name0" axis="ch" ptType="node">
+      <dgm:layoutNode name="parentText" styleLbl="node1">
+        <dgm:varLst>
+          <dgm:chMax val="0"/>
+          <dgm:bulletEnabled val="1"/>
+        </dgm:varLst>
+        <dgm:alg type="tx">
+          <dgm:param type="parTxLTRAlign" val="l"/>
+          <dgm:param type="parTxRTLAlign" val="r"/>
+        </dgm:alg>
+        <dgm:shape xmlns:r="http://schemas.openxmlformats.org/officeDocument/2006/relationships" type="roundRect" r:blip="">
+          <dgm:adjLst/>
+        </dgm:shape>
+        <dgm:presOf axis="self"/>
+        <dgm:constrLst>
+          <dgm:constr type="tMarg" refType="primFontSz" fact="0.3"/>
+          <dgm:constr type="bMarg" refType="primFontSz" fact="0.3"/>
+          <dgm:constr type="lMarg" refType="primFontSz" fact="0.3"/>
+          <dgm:constr type="rMarg" refType="primFontSz" fact="0.3"/>
+        </dgm:constrLst>
+        <dgm:ruleLst>
+          <dgm:rule type="h" val="INF" fact="NaN" max="NaN"/>
+        </dgm:ruleLst>
+      </dgm:layoutNode>
+      <dgm:choose name="Name1">
+        <dgm:if name="Name2" axis="ch" ptType="node" func="cnt" op="gte" val="1">
+          <dgm:layoutNode name="childText" styleLbl="revTx">
+            <dgm:varLst>
+              <dgm:bulletEnabled val="1"/>
+            </dgm:varLst>
+            <dgm:alg type="tx">
+              <dgm:param type="stBulletLvl" val="1"/>
+              <dgm:param type="lnSpAfChP" val="20"/>
+            </dgm:alg>
+            <dgm:shape xmlns:r="http://schemas.openxmlformats.org/officeDocument/2006/relationships" type="rect" r:blip="">
+              <dgm:adjLst/>
+            </dgm:shape>
+            <dgm:presOf axis="des" ptType="node"/>
+            <dgm:constrLst>
+              <dgm:constr type="tMarg" refType="primFontSz" fact="0.1"/>
+              <dgm:constr type="bMarg" refType="primFontSz" fact="0.1"/>
+              <dgm:constr type="lMarg" refType="w" fact="0.09"/>
+            </dgm:constrLst>
+            <dgm:ruleLst>
+              <dgm:rule type="h" val="INF" fact="NaN" max="NaN"/>
+            </dgm:ruleLst>
+          </dgm:layoutNode>
+        </dgm:if>
+        <dgm:else name="Name3">
+          <dgm:choose name="Name4">
+            <dgm:if name="Name5" axis="par ch" ptType="doc node" func="cnt" op="gte" val="2">
+              <dgm:forEach name="Name6" axis="followSib" ptType="sibTrans" cnt="1">
+                <dgm:layoutNode name="spacer">
+                  <dgm:alg type="sp"/>
+                  <dgm:shape xmlns:r="http://schemas.openxmlformats.org/officeDocument/2006/relationships" r:blip="">
+                    <dgm:adjLst/>
+                  </dgm:shape>
+                  <dgm:presOf/>
+                  <dgm:constrLst/>
+                  <dgm:ruleLst/>
+                </dgm:layoutNode>
+              </dgm:forEach>
+            </dgm:if>
+            <dgm:else name="Name7"/>
+          </dgm:choose>
+        </dgm:else>
+      </dgm:choose>
+    </dgm:forEach>
+  </dgm:layoutNode>
+</dgm:layoutDef>
+</file>
+
 <file path=ppt/diagrams/quickStyle1.xml><?xml version="1.0" encoding="utf-8"?>
 <dgm:styleDef xmlns:dgm="http://schemas.openxmlformats.org/drawingml/2006/diagram" xmlns:a="http://schemas.openxmlformats.org/drawingml/2006/main" uniqueId="urn:microsoft.com/office/officeart/2005/8/quickstyle/simple1">
   <dgm:title val=""/>
@@ -4201,6 +5626,1040 @@
 </file>
 
 <file path=ppt/diagrams/quickStyle2.xml><?xml version="1.0" encoding="utf-8"?>
+<dgm:styleDef xmlns:dgm="http://schemas.openxmlformats.org/drawingml/2006/diagram" xmlns:a="http://schemas.openxmlformats.org/drawingml/2006/main" uniqueId="urn:microsoft.com/office/officeart/2005/8/quickstyle/simple1">
+  <dgm:title val=""/>
+  <dgm:desc val=""/>
+  <dgm:catLst>
+    <dgm:cat type="simple" pri="10100"/>
+  </dgm:catLst>
+  <dgm:scene3d>
+    <a:camera prst="orthographicFront"/>
+    <a:lightRig rig="threePt" dir="t"/>
+  </dgm:scene3d>
+  <dgm:styleLbl name="node0">
+    <dgm:scene3d>
+      <a:camera prst="orthographicFront"/>
+      <a:lightRig rig="threePt" dir="t"/>
+    </dgm:scene3d>
+    <dgm:sp3d/>
+    <dgm:txPr/>
+    <dgm:style>
+      <a:lnRef idx="2">
+        <a:scrgbClr r="0" g="0" b="0"/>
+      </a:lnRef>
+      <a:fillRef idx="1">
+        <a:scrgbClr r="0" g="0" b="0"/>
+      </a:fillRef>
+      <a:effectRef idx="0">
+        <a:scrgbClr r="0" g="0" b="0"/>
+      </a:effectRef>
+      <a:fontRef idx="minor">
+        <a:schemeClr val="lt1"/>
+      </a:fontRef>
+    </dgm:style>
+  </dgm:styleLbl>
+  <dgm:styleLbl name="lnNode1">
+    <dgm:scene3d>
+      <a:camera prst="orthographicFront"/>
+      <a:lightRig rig="threePt" dir="t"/>
+    </dgm:scene3d>
+    <dgm:sp3d/>
+    <dgm:txPr/>
+    <dgm:style>
+      <a:lnRef idx="2">
+        <a:scrgbClr r="0" g="0" b="0"/>
+      </a:lnRef>
+      <a:fillRef idx="1">
+        <a:scrgbClr r="0" g="0" b="0"/>
+      </a:fillRef>
+      <a:effectRef idx="0">
+        <a:scrgbClr r="0" g="0" b="0"/>
+      </a:effectRef>
+      <a:fontRef idx="minor">
+        <a:schemeClr val="lt1"/>
+      </a:fontRef>
+    </dgm:style>
+  </dgm:styleLbl>
+  <dgm:styleLbl name="vennNode1">
+    <dgm:scene3d>
+      <a:camera prst="orthographicFront"/>
+      <a:lightRig rig="threePt" dir="t"/>
+    </dgm:scene3d>
+    <dgm:sp3d/>
+    <dgm:txPr/>
+    <dgm:style>
+      <a:lnRef idx="2">
+        <a:scrgbClr r="0" g="0" b="0"/>
+      </a:lnRef>
+      <a:fillRef idx="1">
+        <a:scrgbClr r="0" g="0" b="0"/>
+      </a:fillRef>
+      <a:effectRef idx="0">
+        <a:scrgbClr r="0" g="0" b="0"/>
+      </a:effectRef>
+      <a:fontRef idx="minor">
+        <a:schemeClr val="tx1"/>
+      </a:fontRef>
+    </dgm:style>
+  </dgm:styleLbl>
+  <dgm:styleLbl name="alignNode1">
+    <dgm:scene3d>
+      <a:camera prst="orthographicFront"/>
+      <a:lightRig rig="threePt" dir="t"/>
+    </dgm:scene3d>
+    <dgm:sp3d/>
+    <dgm:txPr/>
+    <dgm:style>
+      <a:lnRef idx="2">
+        <a:scrgbClr r="0" g="0" b="0"/>
+      </a:lnRef>
+      <a:fillRef idx="1">
+        <a:scrgbClr r="0" g="0" b="0"/>
+      </a:fillRef>
+      <a:effectRef idx="0">
+        <a:scrgbClr r="0" g="0" b="0"/>
+      </a:effectRef>
+      <a:fontRef idx="minor">
+        <a:schemeClr val="lt1"/>
+      </a:fontRef>
+    </dgm:style>
+  </dgm:styleLbl>
+  <dgm:styleLbl name="node1">
+    <dgm:scene3d>
+      <a:camera prst="orthographicFront"/>
+      <a:lightRig rig="threePt" dir="t"/>
+    </dgm:scene3d>
+    <dgm:sp3d/>
+    <dgm:txPr/>
+    <dgm:style>
+      <a:lnRef idx="2">
+        <a:scrgbClr r="0" g="0" b="0"/>
+      </a:lnRef>
+      <a:fillRef idx="1">
+        <a:scrgbClr r="0" g="0" b="0"/>
+      </a:fillRef>
+      <a:effectRef idx="0">
+        <a:scrgbClr r="0" g="0" b="0"/>
+      </a:effectRef>
+      <a:fontRef idx="minor">
+        <a:schemeClr val="lt1"/>
+      </a:fontRef>
+    </dgm:style>
+  </dgm:styleLbl>
+  <dgm:styleLbl name="node2">
+    <dgm:scene3d>
+      <a:camera prst="orthographicFront"/>
+      <a:lightRig rig="threePt" dir="t"/>
+    </dgm:scene3d>
+    <dgm:sp3d/>
+    <dgm:txPr/>
+    <dgm:style>
+      <a:lnRef idx="2">
+        <a:scrgbClr r="0" g="0" b="0"/>
+      </a:lnRef>
+      <a:fillRef idx="1">
+        <a:scrgbClr r="0" g="0" b="0"/>
+      </a:fillRef>
+      <a:effectRef idx="0">
+        <a:scrgbClr r="0" g="0" b="0"/>
+      </a:effectRef>
+      <a:fontRef idx="minor">
+        <a:schemeClr val="lt1"/>
+      </a:fontRef>
+    </dgm:style>
+  </dgm:styleLbl>
+  <dgm:styleLbl name="node3">
+    <dgm:scene3d>
+      <a:camera prst="orthographicFront"/>
+      <a:lightRig rig="threePt" dir="t"/>
+    </dgm:scene3d>
+    <dgm:sp3d/>
+    <dgm:txPr/>
+    <dgm:style>
+      <a:lnRef idx="2">
+        <a:scrgbClr r="0" g="0" b="0"/>
+      </a:lnRef>
+      <a:fillRef idx="1">
+        <a:scrgbClr r="0" g="0" b="0"/>
+      </a:fillRef>
+      <a:effectRef idx="0">
+        <a:scrgbClr r="0" g="0" b="0"/>
+      </a:effectRef>
+      <a:fontRef idx="minor">
+        <a:schemeClr val="lt1"/>
+      </a:fontRef>
+    </dgm:style>
+  </dgm:styleLbl>
+  <dgm:styleLbl name="node4">
+    <dgm:scene3d>
+      <a:camera prst="orthographicFront"/>
+      <a:lightRig rig="threePt" dir="t"/>
+    </dgm:scene3d>
+    <dgm:sp3d/>
+    <dgm:txPr/>
+    <dgm:style>
+      <a:lnRef idx="2">
+        <a:scrgbClr r="0" g="0" b="0"/>
+      </a:lnRef>
+      <a:fillRef idx="1">
+        <a:scrgbClr r="0" g="0" b="0"/>
+      </a:fillRef>
+      <a:effectRef idx="0">
+        <a:scrgbClr r="0" g="0" b="0"/>
+      </a:effectRef>
+      <a:fontRef idx="minor">
+        <a:schemeClr val="lt1"/>
+      </a:fontRef>
+    </dgm:style>
+  </dgm:styleLbl>
+  <dgm:styleLbl name="fgImgPlace1">
+    <dgm:scene3d>
+      <a:camera prst="orthographicFront"/>
+      <a:lightRig rig="threePt" dir="t"/>
+    </dgm:scene3d>
+    <dgm:sp3d/>
+    <dgm:txPr/>
+    <dgm:style>
+      <a:lnRef idx="2">
+        <a:scrgbClr r="0" g="0" b="0"/>
+      </a:lnRef>
+      <a:fillRef idx="1">
+        <a:scrgbClr r="0" g="0" b="0"/>
+      </a:fillRef>
+      <a:effectRef idx="0">
+        <a:scrgbClr r="0" g="0" b="0"/>
+      </a:effectRef>
+      <a:fontRef idx="minor"/>
+    </dgm:style>
+  </dgm:styleLbl>
+  <dgm:styleLbl name="alignImgPlace1">
+    <dgm:scene3d>
+      <a:camera prst="orthographicFront"/>
+      <a:lightRig rig="threePt" dir="t"/>
+    </dgm:scene3d>
+    <dgm:sp3d/>
+    <dgm:txPr/>
+    <dgm:style>
+      <a:lnRef idx="2">
+        <a:scrgbClr r="0" g="0" b="0"/>
+      </a:lnRef>
+      <a:fillRef idx="1">
+        <a:scrgbClr r="0" g="0" b="0"/>
+      </a:fillRef>
+      <a:effectRef idx="0">
+        <a:scrgbClr r="0" g="0" b="0"/>
+      </a:effectRef>
+      <a:fontRef idx="minor"/>
+    </dgm:style>
+  </dgm:styleLbl>
+  <dgm:styleLbl name="bgImgPlace1">
+    <dgm:scene3d>
+      <a:camera prst="orthographicFront"/>
+      <a:lightRig rig="threePt" dir="t"/>
+    </dgm:scene3d>
+    <dgm:sp3d/>
+    <dgm:txPr/>
+    <dgm:style>
+      <a:lnRef idx="2">
+        <a:scrgbClr r="0" g="0" b="0"/>
+      </a:lnRef>
+      <a:fillRef idx="1">
+        <a:scrgbClr r="0" g="0" b="0"/>
+      </a:fillRef>
+      <a:effectRef idx="0">
+        <a:scrgbClr r="0" g="0" b="0"/>
+      </a:effectRef>
+      <a:fontRef idx="minor"/>
+    </dgm:style>
+  </dgm:styleLbl>
+  <dgm:styleLbl name="sibTrans2D1">
+    <dgm:scene3d>
+      <a:camera prst="orthographicFront"/>
+      <a:lightRig rig="threePt" dir="t"/>
+    </dgm:scene3d>
+    <dgm:sp3d/>
+    <dgm:txPr/>
+    <dgm:style>
+      <a:lnRef idx="0">
+        <a:scrgbClr r="0" g="0" b="0"/>
+      </a:lnRef>
+      <a:fillRef idx="1">
+        <a:scrgbClr r="0" g="0" b="0"/>
+      </a:fillRef>
+      <a:effectRef idx="0">
+        <a:scrgbClr r="0" g="0" b="0"/>
+      </a:effectRef>
+      <a:fontRef idx="minor">
+        <a:schemeClr val="lt1"/>
+      </a:fontRef>
+    </dgm:style>
+  </dgm:styleLbl>
+  <dgm:styleLbl name="fgSibTrans2D1">
+    <dgm:scene3d>
+      <a:camera prst="orthographicFront"/>
+      <a:lightRig rig="threePt" dir="t"/>
+    </dgm:scene3d>
+    <dgm:sp3d/>
+    <dgm:txPr/>
+    <dgm:style>
+      <a:lnRef idx="0">
+        <a:scrgbClr r="0" g="0" b="0"/>
+      </a:lnRef>
+      <a:fillRef idx="1">
+        <a:scrgbClr r="0" g="0" b="0"/>
+      </a:fillRef>
+      <a:effectRef idx="0">
+        <a:scrgbClr r="0" g="0" b="0"/>
+      </a:effectRef>
+      <a:fontRef idx="minor">
+        <a:schemeClr val="lt1"/>
+      </a:fontRef>
+    </dgm:style>
+  </dgm:styleLbl>
+  <dgm:styleLbl name="bgSibTrans2D1">
+    <dgm:scene3d>
+      <a:camera prst="orthographicFront"/>
+      <a:lightRig rig="threePt" dir="t"/>
+    </dgm:scene3d>
+    <dgm:sp3d/>
+    <dgm:txPr/>
+    <dgm:style>
+      <a:lnRef idx="0">
+        <a:scrgbClr r="0" g="0" b="0"/>
+      </a:lnRef>
+      <a:fillRef idx="1">
+        <a:scrgbClr r="0" g="0" b="0"/>
+      </a:fillRef>
+      <a:effectRef idx="0">
+        <a:scrgbClr r="0" g="0" b="0"/>
+      </a:effectRef>
+      <a:fontRef idx="minor">
+        <a:schemeClr val="lt1"/>
+      </a:fontRef>
+    </dgm:style>
+  </dgm:styleLbl>
+  <dgm:styleLbl name="sibTrans1D1">
+    <dgm:scene3d>
+      <a:camera prst="orthographicFront"/>
+      <a:lightRig rig="threePt" dir="t"/>
+    </dgm:scene3d>
+    <dgm:sp3d/>
+    <dgm:txPr/>
+    <dgm:style>
+      <a:lnRef idx="1">
+        <a:scrgbClr r="0" g="0" b="0"/>
+      </a:lnRef>
+      <a:fillRef idx="0">
+        <a:scrgbClr r="0" g="0" b="0"/>
+      </a:fillRef>
+      <a:effectRef idx="0">
+        <a:scrgbClr r="0" g="0" b="0"/>
+      </a:effectRef>
+      <a:fontRef idx="minor"/>
+    </dgm:style>
+  </dgm:styleLbl>
+  <dgm:styleLbl name="callout">
+    <dgm:scene3d>
+      <a:camera prst="orthographicFront"/>
+      <a:lightRig rig="threePt" dir="t"/>
+    </dgm:scene3d>
+    <dgm:sp3d/>
+    <dgm:txPr/>
+    <dgm:style>
+      <a:lnRef idx="2">
+        <a:scrgbClr r="0" g="0" b="0"/>
+      </a:lnRef>
+      <a:fillRef idx="1">
+        <a:scrgbClr r="0" g="0" b="0"/>
+      </a:fillRef>
+      <a:effectRef idx="0">
+        <a:scrgbClr r="0" g="0" b="0"/>
+      </a:effectRef>
+      <a:fontRef idx="minor"/>
+    </dgm:style>
+  </dgm:styleLbl>
+  <dgm:styleLbl name="asst0">
+    <dgm:scene3d>
+      <a:camera prst="orthographicFront"/>
+      <a:lightRig rig="threePt" dir="t"/>
+    </dgm:scene3d>
+    <dgm:sp3d/>
+    <dgm:txPr/>
+    <dgm:style>
+      <a:lnRef idx="2">
+        <a:scrgbClr r="0" g="0" b="0"/>
+      </a:lnRef>
+      <a:fillRef idx="1">
+        <a:scrgbClr r="0" g="0" b="0"/>
+      </a:fillRef>
+      <a:effectRef idx="0">
+        <a:scrgbClr r="0" g="0" b="0"/>
+      </a:effectRef>
+      <a:fontRef idx="minor">
+        <a:schemeClr val="lt1"/>
+      </a:fontRef>
+    </dgm:style>
+  </dgm:styleLbl>
+  <dgm:styleLbl name="asst1">
+    <dgm:scene3d>
+      <a:camera prst="orthographicFront"/>
+      <a:lightRig rig="threePt" dir="t"/>
+    </dgm:scene3d>
+    <dgm:sp3d/>
+    <dgm:txPr/>
+    <dgm:style>
+      <a:lnRef idx="2">
+        <a:scrgbClr r="0" g="0" b="0"/>
+      </a:lnRef>
+      <a:fillRef idx="1">
+        <a:scrgbClr r="0" g="0" b="0"/>
+      </a:fillRef>
+      <a:effectRef idx="0">
+        <a:scrgbClr r="0" g="0" b="0"/>
+      </a:effectRef>
+      <a:fontRef idx="minor">
+        <a:schemeClr val="lt1"/>
+      </a:fontRef>
+    </dgm:style>
+  </dgm:styleLbl>
+  <dgm:styleLbl name="asst2">
+    <dgm:scene3d>
+      <a:camera prst="orthographicFront"/>
+      <a:lightRig rig="threePt" dir="t"/>
+    </dgm:scene3d>
+    <dgm:sp3d/>
+    <dgm:txPr/>
+    <dgm:style>
+      <a:lnRef idx="2">
+        <a:scrgbClr r="0" g="0" b="0"/>
+      </a:lnRef>
+      <a:fillRef idx="1">
+        <a:scrgbClr r="0" g="0" b="0"/>
+      </a:fillRef>
+      <a:effectRef idx="0">
+        <a:scrgbClr r="0" g="0" b="0"/>
+      </a:effectRef>
+      <a:fontRef idx="minor">
+        <a:schemeClr val="lt1"/>
+      </a:fontRef>
+    </dgm:style>
+  </dgm:styleLbl>
+  <dgm:styleLbl name="asst3">
+    <dgm:scene3d>
+      <a:camera prst="orthographicFront"/>
+      <a:lightRig rig="threePt" dir="t"/>
+    </dgm:scene3d>
+    <dgm:sp3d/>
+    <dgm:txPr/>
+    <dgm:style>
+      <a:lnRef idx="2">
+        <a:scrgbClr r="0" g="0" b="0"/>
+      </a:lnRef>
+      <a:fillRef idx="1">
+        <a:scrgbClr r="0" g="0" b="0"/>
+      </a:fillRef>
+      <a:effectRef idx="0">
+        <a:scrgbClr r="0" g="0" b="0"/>
+      </a:effectRef>
+      <a:fontRef idx="minor">
+        <a:schemeClr val="lt1"/>
+      </a:fontRef>
+    </dgm:style>
+  </dgm:styleLbl>
+  <dgm:styleLbl name="asst4">
+    <dgm:scene3d>
+      <a:camera prst="orthographicFront"/>
+      <a:lightRig rig="threePt" dir="t"/>
+    </dgm:scene3d>
+    <dgm:sp3d/>
+    <dgm:txPr/>
+    <dgm:style>
+      <a:lnRef idx="2">
+        <a:scrgbClr r="0" g="0" b="0"/>
+      </a:lnRef>
+      <a:fillRef idx="1">
+        <a:scrgbClr r="0" g="0" b="0"/>
+      </a:fillRef>
+      <a:effectRef idx="0">
+        <a:scrgbClr r="0" g="0" b="0"/>
+      </a:effectRef>
+      <a:fontRef idx="minor">
+        <a:schemeClr val="lt1"/>
+      </a:fontRef>
+    </dgm:style>
+  </dgm:styleLbl>
+  <dgm:styleLbl name="parChTrans2D1">
+    <dgm:scene3d>
+      <a:camera prst="orthographicFront"/>
+      <a:lightRig rig="threePt" dir="t"/>
+    </dgm:scene3d>
+    <dgm:sp3d/>
+    <dgm:txPr/>
+    <dgm:style>
+      <a:lnRef idx="2">
+        <a:scrgbClr r="0" g="0" b="0"/>
+      </a:lnRef>
+      <a:fillRef idx="1">
+        <a:scrgbClr r="0" g="0" b="0"/>
+      </a:fillRef>
+      <a:effectRef idx="0">
+        <a:scrgbClr r="0" g="0" b="0"/>
+      </a:effectRef>
+      <a:fontRef idx="minor">
+        <a:schemeClr val="lt1"/>
+      </a:fontRef>
+    </dgm:style>
+  </dgm:styleLbl>
+  <dgm:styleLbl name="parChTrans2D2">
+    <dgm:scene3d>
+      <a:camera prst="orthographicFront"/>
+      <a:lightRig rig="threePt" dir="t"/>
+    </dgm:scene3d>
+    <dgm:sp3d/>
+    <dgm:txPr/>
+    <dgm:style>
+      <a:lnRef idx="2">
+        <a:scrgbClr r="0" g="0" b="0"/>
+      </a:lnRef>
+      <a:fillRef idx="1">
+        <a:scrgbClr r="0" g="0" b="0"/>
+      </a:fillRef>
+      <a:effectRef idx="0">
+        <a:scrgbClr r="0" g="0" b="0"/>
+      </a:effectRef>
+      <a:fontRef idx="minor">
+        <a:schemeClr val="lt1"/>
+      </a:fontRef>
+    </dgm:style>
+  </dgm:styleLbl>
+  <dgm:styleLbl name="parChTrans2D3">
+    <dgm:scene3d>
+      <a:camera prst="orthographicFront"/>
+      <a:lightRig rig="threePt" dir="t"/>
+    </dgm:scene3d>
+    <dgm:sp3d/>
+    <dgm:txPr/>
+    <dgm:style>
+      <a:lnRef idx="2">
+        <a:scrgbClr r="0" g="0" b="0"/>
+      </a:lnRef>
+      <a:fillRef idx="1">
+        <a:scrgbClr r="0" g="0" b="0"/>
+      </a:fillRef>
+      <a:effectRef idx="0">
+        <a:scrgbClr r="0" g="0" b="0"/>
+      </a:effectRef>
+      <a:fontRef idx="minor">
+        <a:schemeClr val="lt1"/>
+      </a:fontRef>
+    </dgm:style>
+  </dgm:styleLbl>
+  <dgm:styleLbl name="parChTrans2D4">
+    <dgm:scene3d>
+      <a:camera prst="orthographicFront"/>
+      <a:lightRig rig="threePt" dir="t"/>
+    </dgm:scene3d>
+    <dgm:sp3d/>
+    <dgm:txPr/>
+    <dgm:style>
+      <a:lnRef idx="2">
+        <a:scrgbClr r="0" g="0" b="0"/>
+      </a:lnRef>
+      <a:fillRef idx="1">
+        <a:scrgbClr r="0" g="0" b="0"/>
+      </a:fillRef>
+      <a:effectRef idx="0">
+        <a:scrgbClr r="0" g="0" b="0"/>
+      </a:effectRef>
+      <a:fontRef idx="minor">
+        <a:schemeClr val="lt1"/>
+      </a:fontRef>
+    </dgm:style>
+  </dgm:styleLbl>
+  <dgm:styleLbl name="parChTrans1D1">
+    <dgm:scene3d>
+      <a:camera prst="orthographicFront"/>
+      <a:lightRig rig="threePt" dir="t"/>
+    </dgm:scene3d>
+    <dgm:sp3d/>
+    <dgm:txPr/>
+    <dgm:style>
+      <a:lnRef idx="2">
+        <a:scrgbClr r="0" g="0" b="0"/>
+      </a:lnRef>
+      <a:fillRef idx="0">
+        <a:scrgbClr r="0" g="0" b="0"/>
+      </a:fillRef>
+      <a:effectRef idx="0">
+        <a:scrgbClr r="0" g="0" b="0"/>
+      </a:effectRef>
+      <a:fontRef idx="minor"/>
+    </dgm:style>
+  </dgm:styleLbl>
+  <dgm:styleLbl name="parChTrans1D2">
+    <dgm:scene3d>
+      <a:camera prst="orthographicFront"/>
+      <a:lightRig rig="threePt" dir="t"/>
+    </dgm:scene3d>
+    <dgm:sp3d/>
+    <dgm:txPr/>
+    <dgm:style>
+      <a:lnRef idx="2">
+        <a:scrgbClr r="0" g="0" b="0"/>
+      </a:lnRef>
+      <a:fillRef idx="0">
+        <a:scrgbClr r="0" g="0" b="0"/>
+      </a:fillRef>
+      <a:effectRef idx="0">
+        <a:scrgbClr r="0" g="0" b="0"/>
+      </a:effectRef>
+      <a:fontRef idx="minor"/>
+    </dgm:style>
+  </dgm:styleLbl>
+  <dgm:styleLbl name="parChTrans1D3">
+    <dgm:scene3d>
+      <a:camera prst="orthographicFront"/>
+      <a:lightRig rig="threePt" dir="t"/>
+    </dgm:scene3d>
+    <dgm:sp3d/>
+    <dgm:txPr/>
+    <dgm:style>
+      <a:lnRef idx="2">
+        <a:scrgbClr r="0" g="0" b="0"/>
+      </a:lnRef>
+      <a:fillRef idx="0">
+        <a:scrgbClr r="0" g="0" b="0"/>
+      </a:fillRef>
+      <a:effectRef idx="0">
+        <a:scrgbClr r="0" g="0" b="0"/>
+      </a:effectRef>
+      <a:fontRef idx="minor"/>
+    </dgm:style>
+  </dgm:styleLbl>
+  <dgm:styleLbl name="parChTrans1D4">
+    <dgm:scene3d>
+      <a:camera prst="orthographicFront"/>
+      <a:lightRig rig="threePt" dir="t"/>
+    </dgm:scene3d>
+    <dgm:sp3d/>
+    <dgm:txPr/>
+    <dgm:style>
+      <a:lnRef idx="2">
+        <a:scrgbClr r="0" g="0" b="0"/>
+      </a:lnRef>
+      <a:fillRef idx="0">
+        <a:scrgbClr r="0" g="0" b="0"/>
+      </a:fillRef>
+      <a:effectRef idx="0">
+        <a:scrgbClr r="0" g="0" b="0"/>
+      </a:effectRef>
+      <a:fontRef idx="minor"/>
+    </dgm:style>
+  </dgm:styleLbl>
+  <dgm:styleLbl name="fgAcc1">
+    <dgm:scene3d>
+      <a:camera prst="orthographicFront"/>
+      <a:lightRig rig="threePt" dir="t"/>
+    </dgm:scene3d>
+    <dgm:sp3d/>
+    <dgm:txPr/>
+    <dgm:style>
+      <a:lnRef idx="2">
+        <a:scrgbClr r="0" g="0" b="0"/>
+      </a:lnRef>
+      <a:fillRef idx="1">
+        <a:scrgbClr r="0" g="0" b="0"/>
+      </a:fillRef>
+      <a:effectRef idx="0">
+        <a:scrgbClr r="0" g="0" b="0"/>
+      </a:effectRef>
+      <a:fontRef idx="minor"/>
+    </dgm:style>
+  </dgm:styleLbl>
+  <dgm:styleLbl name="conFgAcc1">
+    <dgm:scene3d>
+      <a:camera prst="orthographicFront"/>
+      <a:lightRig rig="threePt" dir="t"/>
+    </dgm:scene3d>
+    <dgm:sp3d/>
+    <dgm:txPr/>
+    <dgm:style>
+      <a:lnRef idx="2">
+        <a:scrgbClr r="0" g="0" b="0"/>
+      </a:lnRef>
+      <a:fillRef idx="1">
+        <a:scrgbClr r="0" g="0" b="0"/>
+      </a:fillRef>
+      <a:effectRef idx="0">
+        <a:scrgbClr r="0" g="0" b="0"/>
+      </a:effectRef>
+      <a:fontRef idx="minor"/>
+    </dgm:style>
+  </dgm:styleLbl>
+  <dgm:styleLbl name="alignAcc1">
+    <dgm:scene3d>
+      <a:camera prst="orthographicFront"/>
+      <a:lightRig rig="threePt" dir="t"/>
+    </dgm:scene3d>
+    <dgm:sp3d/>
+    <dgm:txPr/>
+    <dgm:style>
+      <a:lnRef idx="2">
+        <a:scrgbClr r="0" g="0" b="0"/>
+      </a:lnRef>
+      <a:fillRef idx="1">
+        <a:scrgbClr r="0" g="0" b="0"/>
+      </a:fillRef>
+      <a:effectRef idx="0">
+        <a:scrgbClr r="0" g="0" b="0"/>
+      </a:effectRef>
+      <a:fontRef idx="minor"/>
+    </dgm:style>
+  </dgm:styleLbl>
+  <dgm:styleLbl name="trAlignAcc1">
+    <dgm:scene3d>
+      <a:camera prst="orthographicFront"/>
+      <a:lightRig rig="threePt" dir="t"/>
+    </dgm:scene3d>
+    <dgm:sp3d/>
+    <dgm:txPr/>
+    <dgm:style>
+      <a:lnRef idx="1">
+        <a:scrgbClr r="0" g="0" b="0"/>
+      </a:lnRef>
+      <a:fillRef idx="1">
+        <a:scrgbClr r="0" g="0" b="0"/>
+      </a:fillRef>
+      <a:effectRef idx="0">
+        <a:scrgbClr r="0" g="0" b="0"/>
+      </a:effectRef>
+      <a:fontRef idx="minor"/>
+    </dgm:style>
+  </dgm:styleLbl>
+  <dgm:styleLbl name="bgAcc1">
+    <dgm:scene3d>
+      <a:camera prst="orthographicFront"/>
+      <a:lightRig rig="threePt" dir="t"/>
+    </dgm:scene3d>
+    <dgm:sp3d/>
+    <dgm:txPr/>
+    <dgm:style>
+      <a:lnRef idx="2">
+        <a:scrgbClr r="0" g="0" b="0"/>
+      </a:lnRef>
+      <a:fillRef idx="1">
+        <a:scrgbClr r="0" g="0" b="0"/>
+      </a:fillRef>
+      <a:effectRef idx="0">
+        <a:scrgbClr r="0" g="0" b="0"/>
+      </a:effectRef>
+      <a:fontRef idx="minor"/>
+    </dgm:style>
+  </dgm:styleLbl>
+  <dgm:styleLbl name="solidFgAcc1">
+    <dgm:scene3d>
+      <a:camera prst="orthographicFront"/>
+      <a:lightRig rig="threePt" dir="t"/>
+    </dgm:scene3d>
+    <dgm:sp3d/>
+    <dgm:txPr/>
+    <dgm:style>
+      <a:lnRef idx="2">
+        <a:scrgbClr r="0" g="0" b="0"/>
+      </a:lnRef>
+      <a:fillRef idx="1">
+        <a:scrgbClr r="0" g="0" b="0"/>
+      </a:fillRef>
+      <a:effectRef idx="0">
+        <a:scrgbClr r="0" g="0" b="0"/>
+      </a:effectRef>
+      <a:fontRef idx="minor"/>
+    </dgm:style>
+  </dgm:styleLbl>
+  <dgm:styleLbl name="solidAlignAcc1">
+    <dgm:scene3d>
+      <a:camera prst="orthographicFront"/>
+      <a:lightRig rig="threePt" dir="t"/>
+    </dgm:scene3d>
+    <dgm:sp3d/>
+    <dgm:txPr/>
+    <dgm:style>
+      <a:lnRef idx="2">
+        <a:scrgbClr r="0" g="0" b="0"/>
+      </a:lnRef>
+      <a:fillRef idx="1">
+        <a:scrgbClr r="0" g="0" b="0"/>
+      </a:fillRef>
+      <a:effectRef idx="0">
+        <a:scrgbClr r="0" g="0" b="0"/>
+      </a:effectRef>
+      <a:fontRef idx="minor"/>
+    </dgm:style>
+  </dgm:styleLbl>
+  <dgm:styleLbl name="solidBgAcc1">
+    <dgm:scene3d>
+      <a:camera prst="orthographicFront"/>
+      <a:lightRig rig="threePt" dir="t"/>
+    </dgm:scene3d>
+    <dgm:sp3d/>
+    <dgm:txPr/>
+    <dgm:style>
+      <a:lnRef idx="2">
+        <a:scrgbClr r="0" g="0" b="0"/>
+      </a:lnRef>
+      <a:fillRef idx="1">
+        <a:scrgbClr r="0" g="0" b="0"/>
+      </a:fillRef>
+      <a:effectRef idx="0">
+        <a:scrgbClr r="0" g="0" b="0"/>
+      </a:effectRef>
+      <a:fontRef idx="minor"/>
+    </dgm:style>
+  </dgm:styleLbl>
+  <dgm:styleLbl name="fgAccFollowNode1">
+    <dgm:scene3d>
+      <a:camera prst="orthographicFront"/>
+      <a:lightRig rig="threePt" dir="t"/>
+    </dgm:scene3d>
+    <dgm:sp3d/>
+    <dgm:txPr/>
+    <dgm:style>
+      <a:lnRef idx="2">
+        <a:scrgbClr r="0" g="0" b="0"/>
+      </a:lnRef>
+      <a:fillRef idx="1">
+        <a:scrgbClr r="0" g="0" b="0"/>
+      </a:fillRef>
+      <a:effectRef idx="0">
+        <a:scrgbClr r="0" g="0" b="0"/>
+      </a:effectRef>
+      <a:fontRef idx="minor"/>
+    </dgm:style>
+  </dgm:styleLbl>
+  <dgm:styleLbl name="alignAccFollowNode1">
+    <dgm:scene3d>
+      <a:camera prst="orthographicFront"/>
+      <a:lightRig rig="threePt" dir="t"/>
+    </dgm:scene3d>
+    <dgm:sp3d/>
+    <dgm:txPr/>
+    <dgm:style>
+      <a:lnRef idx="2">
+        <a:scrgbClr r="0" g="0" b="0"/>
+      </a:lnRef>
+      <a:fillRef idx="1">
+        <a:scrgbClr r="0" g="0" b="0"/>
+      </a:fillRef>
+      <a:effectRef idx="0">
+        <a:scrgbClr r="0" g="0" b="0"/>
+      </a:effectRef>
+      <a:fontRef idx="minor"/>
+    </dgm:style>
+  </dgm:styleLbl>
+  <dgm:styleLbl name="bgAccFollowNode1">
+    <dgm:scene3d>
+      <a:camera prst="orthographicFront"/>
+      <a:lightRig rig="threePt" dir="t"/>
+    </dgm:scene3d>
+    <dgm:sp3d/>
+    <dgm:txPr/>
+    <dgm:style>
+      <a:lnRef idx="2">
+        <a:scrgbClr r="0" g="0" b="0"/>
+      </a:lnRef>
+      <a:fillRef idx="1">
+        <a:scrgbClr r="0" g="0" b="0"/>
+      </a:fillRef>
+      <a:effectRef idx="0">
+        <a:scrgbClr r="0" g="0" b="0"/>
+      </a:effectRef>
+      <a:fontRef idx="minor"/>
+    </dgm:style>
+  </dgm:styleLbl>
+  <dgm:styleLbl name="fgAcc0">
+    <dgm:scene3d>
+      <a:camera prst="orthographicFront"/>
+      <a:lightRig rig="threePt" dir="t"/>
+    </dgm:scene3d>
+    <dgm:sp3d/>
+    <dgm:txPr/>
+    <dgm:style>
+      <a:lnRef idx="2">
+        <a:scrgbClr r="0" g="0" b="0"/>
+      </a:lnRef>
+      <a:fillRef idx="1">
+        <a:scrgbClr r="0" g="0" b="0"/>
+      </a:fillRef>
+      <a:effectRef idx="0">
+        <a:scrgbClr r="0" g="0" b="0"/>
+      </a:effectRef>
+      <a:fontRef idx="minor"/>
+    </dgm:style>
+  </dgm:styleLbl>
+  <dgm:styleLbl name="fgAcc2">
+    <dgm:scene3d>
+      <a:camera prst="orthographicFront"/>
+      <a:lightRig rig="threePt" dir="t"/>
+    </dgm:scene3d>
+    <dgm:sp3d/>
+    <dgm:txPr/>
+    <dgm:style>
+      <a:lnRef idx="2">
+        <a:scrgbClr r="0" g="0" b="0"/>
+      </a:lnRef>
+      <a:fillRef idx="1">
+        <a:scrgbClr r="0" g="0" b="0"/>
+      </a:fillRef>
+      <a:effectRef idx="0">
+        <a:scrgbClr r="0" g="0" b="0"/>
+      </a:effectRef>
+      <a:fontRef idx="minor"/>
+    </dgm:style>
+  </dgm:styleLbl>
+  <dgm:styleLbl name="fgAcc3">
+    <dgm:scene3d>
+      <a:camera prst="orthographicFront"/>
+      <a:lightRig rig="threePt" dir="t"/>
+    </dgm:scene3d>
+    <dgm:sp3d/>
+    <dgm:txPr/>
+    <dgm:style>
+      <a:lnRef idx="2">
+        <a:scrgbClr r="0" g="0" b="0"/>
+      </a:lnRef>
+      <a:fillRef idx="1">
+        <a:scrgbClr r="0" g="0" b="0"/>
+      </a:fillRef>
+      <a:effectRef idx="0">
+        <a:scrgbClr r="0" g="0" b="0"/>
+      </a:effectRef>
+      <a:fontRef idx="minor"/>
+    </dgm:style>
+  </dgm:styleLbl>
+  <dgm:styleLbl name="fgAcc4">
+    <dgm:scene3d>
+      <a:camera prst="orthographicFront"/>
+      <a:lightRig rig="threePt" dir="t"/>
+    </dgm:scene3d>
+    <dgm:sp3d/>
+    <dgm:txPr/>
+    <dgm:style>
+      <a:lnRef idx="2">
+        <a:scrgbClr r="0" g="0" b="0"/>
+      </a:lnRef>
+      <a:fillRef idx="1">
+        <a:scrgbClr r="0" g="0" b="0"/>
+      </a:fillRef>
+      <a:effectRef idx="0">
+        <a:scrgbClr r="0" g="0" b="0"/>
+      </a:effectRef>
+      <a:fontRef idx="minor"/>
+    </dgm:style>
+  </dgm:styleLbl>
+  <dgm:styleLbl name="bgShp">
+    <dgm:scene3d>
+      <a:camera prst="orthographicFront"/>
+      <a:lightRig rig="threePt" dir="t"/>
+    </dgm:scene3d>
+    <dgm:sp3d/>
+    <dgm:txPr/>
+    <dgm:style>
+      <a:lnRef idx="0">
+        <a:scrgbClr r="0" g="0" b="0"/>
+      </a:lnRef>
+      <a:fillRef idx="1">
+        <a:scrgbClr r="0" g="0" b="0"/>
+      </a:fillRef>
+      <a:effectRef idx="0">
+        <a:scrgbClr r="0" g="0" b="0"/>
+      </a:effectRef>
+      <a:fontRef idx="minor"/>
+    </dgm:style>
+  </dgm:styleLbl>
+  <dgm:styleLbl name="dkBgShp">
+    <dgm:scene3d>
+      <a:camera prst="orthographicFront"/>
+      <a:lightRig rig="threePt" dir="t"/>
+    </dgm:scene3d>
+    <dgm:sp3d/>
+    <dgm:txPr/>
+    <dgm:style>
+      <a:lnRef idx="0">
+        <a:scrgbClr r="0" g="0" b="0"/>
+      </a:lnRef>
+      <a:fillRef idx="1">
+        <a:scrgbClr r="0" g="0" b="0"/>
+      </a:fillRef>
+      <a:effectRef idx="0">
+        <a:scrgbClr r="0" g="0" b="0"/>
+      </a:effectRef>
+      <a:fontRef idx="minor"/>
+    </dgm:style>
+  </dgm:styleLbl>
+  <dgm:styleLbl name="trBgShp">
+    <dgm:scene3d>
+      <a:camera prst="orthographicFront"/>
+      <a:lightRig rig="threePt" dir="t"/>
+    </dgm:scene3d>
+    <dgm:sp3d/>
+    <dgm:txPr/>
+    <dgm:style>
+      <a:lnRef idx="0">
+        <a:scrgbClr r="0" g="0" b="0"/>
+      </a:lnRef>
+      <a:fillRef idx="1">
+        <a:scrgbClr r="0" g="0" b="0"/>
+      </a:fillRef>
+      <a:effectRef idx="0">
+        <a:scrgbClr r="0" g="0" b="0"/>
+      </a:effectRef>
+      <a:fontRef idx="minor"/>
+    </dgm:style>
+  </dgm:styleLbl>
+  <dgm:styleLbl name="fgShp">
+    <dgm:scene3d>
+      <a:camera prst="orthographicFront"/>
+      <a:lightRig rig="threePt" dir="t"/>
+    </dgm:scene3d>
+    <dgm:sp3d/>
+    <dgm:txPr/>
+    <dgm:style>
+      <a:lnRef idx="2">
+        <a:scrgbClr r="0" g="0" b="0"/>
+      </a:lnRef>
+      <a:fillRef idx="1">
+        <a:scrgbClr r="0" g="0" b="0"/>
+      </a:fillRef>
+      <a:effectRef idx="0">
+        <a:scrgbClr r="0" g="0" b="0"/>
+      </a:effectRef>
+      <a:fontRef idx="minor"/>
+    </dgm:style>
+  </dgm:styleLbl>
+  <dgm:styleLbl name="revTx">
+    <dgm:scene3d>
+      <a:camera prst="orthographicFront"/>
+      <a:lightRig rig="threePt" dir="t"/>
+    </dgm:scene3d>
+    <dgm:sp3d/>
+    <dgm:txPr/>
+    <dgm:style>
+      <a:lnRef idx="0">
+        <a:scrgbClr r="0" g="0" b="0"/>
+      </a:lnRef>
+      <a:fillRef idx="0">
+        <a:scrgbClr r="0" g="0" b="0"/>
+      </a:fillRef>
+      <a:effectRef idx="0">
+        <a:scrgbClr r="0" g="0" b="0"/>
+      </a:effectRef>
+      <a:fontRef idx="minor"/>
+    </dgm:style>
+  </dgm:styleLbl>
+</dgm:styleDef>
+</file>
+
+<file path=ppt/diagrams/quickStyle3.xml><?xml version="1.0" encoding="utf-8"?>
 <dgm:styleDef xmlns:dgm="http://schemas.openxmlformats.org/drawingml/2006/diagram" xmlns:a="http://schemas.openxmlformats.org/drawingml/2006/main" uniqueId="urn:microsoft.com/office/officeart/2005/8/quickstyle/simple1">
   <dgm:title val=""/>
   <dgm:desc val=""/>
@@ -9829,6 +12288,258 @@
           </a:prstGeom>
         </p:spPr>
       </p:pic>
+      <p:sp>
+        <p:nvSpPr>
+          <p:cNvPr id="6" name="TextBox 5">
+            <a:extLst>
+              <a:ext uri="{FF2B5EF4-FFF2-40B4-BE49-F238E27FC236}">
+                <a16:creationId xmlns:a16="http://schemas.microsoft.com/office/drawing/2014/main" id="{7D4D2C7D-FE1C-FA41-8A2A-E4A4A00A2FC3}"/>
+              </a:ext>
+            </a:extLst>
+          </p:cNvPr>
+          <p:cNvSpPr txBox="1"/>
+          <p:nvPr/>
+        </p:nvSpPr>
+        <p:spPr>
+          <a:xfrm>
+            <a:off x="482600" y="6054022"/>
+            <a:ext cx="2070100" cy="687698"/>
+          </a:xfrm>
+          <a:prstGeom prst="rect">
+            <a:avLst/>
+          </a:prstGeom>
+          <a:ln>
+            <a:solidFill>
+              <a:srgbClr val="FF0000"/>
+            </a:solidFill>
+          </a:ln>
+        </p:spPr>
+        <p:txBody>
+          <a:bodyPr vert="horz" lIns="91440" tIns="45720" rIns="91440" bIns="45720" rtlCol="0">
+            <a:normAutofit/>
+          </a:bodyPr>
+          <a:lstStyle/>
+          <a:p>
+            <a:pPr marL="57150" algn="ctr">
+              <a:lnSpc>
+                <a:spcPct val="90000"/>
+              </a:lnSpc>
+              <a:spcAft>
+                <a:spcPts val="600"/>
+              </a:spcAft>
+            </a:pPr>
+            <a:r>
+              <a:rPr lang="en-US" sz="1400" dirty="0" err="1">
+                <a:solidFill>
+                  <a:schemeClr val="tx1">
+                    <a:alpha val="60000"/>
+                  </a:schemeClr>
+                </a:solidFill>
+              </a:rPr>
+              <a:t>GridSearchCV</a:t>
+            </a:r>
+            <a:r>
+              <a:rPr lang="en-US" sz="1400" dirty="0">
+                <a:solidFill>
+                  <a:schemeClr val="tx1">
+                    <a:alpha val="60000"/>
+                  </a:schemeClr>
+                </a:solidFill>
+              </a:rPr>
+              <a:t> picked a </a:t>
+            </a:r>
+            <a:r>
+              <a:rPr lang="en-US" sz="1400" dirty="0" err="1">
+                <a:solidFill>
+                  <a:schemeClr val="tx1">
+                    <a:alpha val="60000"/>
+                  </a:schemeClr>
+                </a:solidFill>
+              </a:rPr>
+              <a:t>max_depth</a:t>
+            </a:r>
+            <a:r>
+              <a:rPr lang="en-US" sz="1400" dirty="0">
+                <a:solidFill>
+                  <a:schemeClr val="tx1">
+                    <a:alpha val="60000"/>
+                  </a:schemeClr>
+                </a:solidFill>
+              </a:rPr>
+              <a:t> of 1 among choices of [1,2,3]</a:t>
+            </a:r>
+          </a:p>
+        </p:txBody>
+      </p:sp>
+      <p:sp>
+        <p:nvSpPr>
+          <p:cNvPr id="14" name="TextBox 13">
+            <a:extLst>
+              <a:ext uri="{FF2B5EF4-FFF2-40B4-BE49-F238E27FC236}">
+                <a16:creationId xmlns:a16="http://schemas.microsoft.com/office/drawing/2014/main" id="{67E10B95-D9AB-DA4F-9F10-116F2C307D6C}"/>
+              </a:ext>
+            </a:extLst>
+          </p:cNvPr>
+          <p:cNvSpPr txBox="1"/>
+          <p:nvPr/>
+        </p:nvSpPr>
+        <p:spPr>
+          <a:xfrm>
+            <a:off x="3807702" y="6054022"/>
+            <a:ext cx="2618498" cy="687698"/>
+          </a:xfrm>
+          <a:prstGeom prst="rect">
+            <a:avLst/>
+          </a:prstGeom>
+          <a:ln>
+            <a:solidFill>
+              <a:srgbClr val="0070C0"/>
+            </a:solidFill>
+          </a:ln>
+        </p:spPr>
+        <p:txBody>
+          <a:bodyPr vert="horz" lIns="91440" tIns="45720" rIns="91440" bIns="45720" rtlCol="0">
+            <a:normAutofit/>
+          </a:bodyPr>
+          <a:lstStyle/>
+          <a:p>
+            <a:pPr marL="57150" algn="ctr">
+              <a:lnSpc>
+                <a:spcPct val="90000"/>
+              </a:lnSpc>
+              <a:spcAft>
+                <a:spcPts val="600"/>
+              </a:spcAft>
+            </a:pPr>
+            <a:r>
+              <a:rPr lang="en-US" sz="1400" dirty="0" err="1">
+                <a:solidFill>
+                  <a:schemeClr val="tx1">
+                    <a:alpha val="60000"/>
+                  </a:schemeClr>
+                </a:solidFill>
+              </a:rPr>
+              <a:t>GridSearchCV</a:t>
+            </a:r>
+            <a:r>
+              <a:rPr lang="en-US" sz="1400" dirty="0">
+                <a:solidFill>
+                  <a:schemeClr val="tx1">
+                    <a:alpha val="60000"/>
+                  </a:schemeClr>
+                </a:solidFill>
+              </a:rPr>
+              <a:t> picked a </a:t>
+            </a:r>
+            <a:r>
+              <a:rPr lang="en-US" sz="1400" dirty="0" err="1">
+                <a:solidFill>
+                  <a:schemeClr val="tx1">
+                    <a:alpha val="60000"/>
+                  </a:schemeClr>
+                </a:solidFill>
+              </a:rPr>
+              <a:t>max_depth</a:t>
+            </a:r>
+            <a:r>
+              <a:rPr lang="en-US" sz="1400" dirty="0">
+                <a:solidFill>
+                  <a:schemeClr val="tx1">
+                    <a:alpha val="60000"/>
+                  </a:schemeClr>
+                </a:solidFill>
+              </a:rPr>
+              <a:t> of 3 among choices of [1,2,3,4,5,6,7,8,9,10]</a:t>
+            </a:r>
+          </a:p>
+        </p:txBody>
+      </p:sp>
+      <p:cxnSp>
+        <p:nvCxnSpPr>
+          <p:cNvPr id="20" name="Straight Arrow Connector 19">
+            <a:extLst>
+              <a:ext uri="{FF2B5EF4-FFF2-40B4-BE49-F238E27FC236}">
+                <a16:creationId xmlns:a16="http://schemas.microsoft.com/office/drawing/2014/main" id="{05612802-DABC-3D45-8B4E-E11ECB9EC612}"/>
+              </a:ext>
+            </a:extLst>
+          </p:cNvPr>
+          <p:cNvCxnSpPr>
+            <a:cxnSpLocks/>
+            <a:stCxn id="14" idx="0"/>
+          </p:cNvCxnSpPr>
+          <p:nvPr/>
+        </p:nvCxnSpPr>
+        <p:spPr>
+          <a:xfrm flipH="1" flipV="1">
+            <a:off x="4189235" y="5577710"/>
+            <a:ext cx="927716" cy="476312"/>
+          </a:xfrm>
+          <a:prstGeom prst="straightConnector1">
+            <a:avLst/>
+          </a:prstGeom>
+          <a:ln>
+            <a:tailEnd type="triangle"/>
+          </a:ln>
+        </p:spPr>
+        <p:style>
+          <a:lnRef idx="1">
+            <a:schemeClr val="accent1"/>
+          </a:lnRef>
+          <a:fillRef idx="0">
+            <a:schemeClr val="accent1"/>
+          </a:fillRef>
+          <a:effectRef idx="0">
+            <a:schemeClr val="accent1"/>
+          </a:effectRef>
+          <a:fontRef idx="minor">
+            <a:schemeClr val="tx1"/>
+          </a:fontRef>
+        </p:style>
+      </p:cxnSp>
+      <p:cxnSp>
+        <p:nvCxnSpPr>
+          <p:cNvPr id="24" name="Straight Arrow Connector 23">
+            <a:extLst>
+              <a:ext uri="{FF2B5EF4-FFF2-40B4-BE49-F238E27FC236}">
+                <a16:creationId xmlns:a16="http://schemas.microsoft.com/office/drawing/2014/main" id="{60CDAE9E-25E3-BA46-8FD2-FE18E794009B}"/>
+              </a:ext>
+            </a:extLst>
+          </p:cNvPr>
+          <p:cNvCxnSpPr>
+            <a:cxnSpLocks/>
+          </p:cNvCxnSpPr>
+          <p:nvPr/>
+        </p:nvCxnSpPr>
+        <p:spPr>
+          <a:xfrm flipV="1">
+            <a:off x="1890447" y="5067300"/>
+            <a:ext cx="1113807" cy="986722"/>
+          </a:xfrm>
+          <a:prstGeom prst="straightConnector1">
+            <a:avLst/>
+          </a:prstGeom>
+          <a:ln>
+            <a:solidFill>
+              <a:srgbClr val="FF0000"/>
+            </a:solidFill>
+            <a:tailEnd type="triangle"/>
+          </a:ln>
+        </p:spPr>
+        <p:style>
+          <a:lnRef idx="1">
+            <a:schemeClr val="accent1"/>
+          </a:lnRef>
+          <a:fillRef idx="0">
+            <a:schemeClr val="accent1"/>
+          </a:fillRef>
+          <a:effectRef idx="0">
+            <a:schemeClr val="accent1"/>
+          </a:effectRef>
+          <a:fontRef idx="minor">
+            <a:schemeClr val="tx1"/>
+          </a:fontRef>
+        </p:style>
+      </p:cxnSp>
     </p:spTree>
     <p:extLst>
       <p:ext uri="{BB962C8B-B14F-4D97-AF65-F5344CB8AC3E}">
@@ -9959,7 +12670,7 @@
           <a:lstStyle/>
           <a:p>
             <a:r>
-              <a:rPr lang="en-US" sz="6000" kern="1200">
+              <a:rPr lang="en-US" sz="6000" kern="1200" dirty="0">
                 <a:solidFill>
                   <a:schemeClr val="bg1"/>
                 </a:solidFill>
@@ -9967,7 +12678,7 @@
                 <a:ea typeface="+mj-ea"/>
                 <a:cs typeface="+mj-cs"/>
               </a:rPr>
-              <a:t>Reflections and Conclusion</a:t>
+              <a:t>Reflections</a:t>
             </a:r>
           </a:p>
         </p:txBody>
@@ -9985,7 +12696,7 @@
           <p:nvPr>
             <p:extLst>
               <p:ext uri="{D42A27DB-BD31-4B8C-83A1-F6EECF244321}">
-                <p14:modId xmlns:p14="http://schemas.microsoft.com/office/powerpoint/2010/main" val="2573420708"/>
+                <p14:modId xmlns:p14="http://schemas.microsoft.com/office/powerpoint/2010/main" val="2491169898"/>
               </p:ext>
             </p:extLst>
           </p:nvPr>
@@ -10004,6 +12715,220 @@
     <p:extLst>
       <p:ext uri="{BB962C8B-B14F-4D97-AF65-F5344CB8AC3E}">
         <p14:creationId xmlns:p14="http://schemas.microsoft.com/office/powerpoint/2010/main" val="645715694"/>
+      </p:ext>
+    </p:extLst>
+  </p:cSld>
+  <p:clrMapOvr>
+    <a:masterClrMapping/>
+  </p:clrMapOvr>
+</p:sld>
+</file>
+
+<file path=ppt/slides/slide13.xml><?xml version="1.0" encoding="utf-8"?>
+<p:sld xmlns:a="http://schemas.openxmlformats.org/drawingml/2006/main" xmlns:r="http://schemas.openxmlformats.org/officeDocument/2006/relationships" xmlns:p="http://schemas.openxmlformats.org/presentationml/2006/main">
+  <p:cSld>
+    <p:bg>
+      <p:bgPr>
+        <a:solidFill>
+          <a:schemeClr val="bg1"/>
+        </a:solidFill>
+        <a:effectLst/>
+      </p:bgPr>
+    </p:bg>
+    <p:spTree>
+      <p:nvGrpSpPr>
+        <p:cNvPr id="1" name=""/>
+        <p:cNvGrpSpPr/>
+        <p:nvPr/>
+      </p:nvGrpSpPr>
+      <p:grpSpPr>
+        <a:xfrm>
+          <a:off x="0" y="0"/>
+          <a:ext cx="0" cy="0"/>
+          <a:chOff x="0" y="0"/>
+          <a:chExt cx="0" cy="0"/>
+        </a:xfrm>
+      </p:grpSpPr>
+      <p:sp>
+        <p:nvSpPr>
+          <p:cNvPr id="17" name="Rectangle 16">
+            <a:extLst>
+              <a:ext uri="{FF2B5EF4-FFF2-40B4-BE49-F238E27FC236}">
+                <a16:creationId xmlns:a16="http://schemas.microsoft.com/office/drawing/2014/main" id="{B819A166-7571-4003-A6B8-B62034C3ED30}"/>
+              </a:ext>
+              <a:ext uri="{C183D7F6-B498-43B3-948B-1728B52AA6E4}">
+                <adec:decorative xmlns:adec="http://schemas.microsoft.com/office/drawing/2017/decorative" val="1"/>
+              </a:ext>
+            </a:extLst>
+          </p:cNvPr>
+          <p:cNvSpPr>
+            <a:spLocks noGrp="1" noRot="1" noChangeAspect="1" noMove="1" noResize="1" noEditPoints="1" noAdjustHandles="1" noChangeArrowheads="1" noChangeShapeType="1" noTextEdit="1"/>
+          </p:cNvSpPr>
+          <p:nvPr>
+            <p:extLst>
+              <p:ext uri="{386F3935-93C4-4BCD-93E2-E3B085C9AB24}">
+                <p16:designElem xmlns:p16="http://schemas.microsoft.com/office/powerpoint/2015/main" val="1"/>
+              </p:ext>
+            </p:extLst>
+          </p:nvPr>
+        </p:nvSpPr>
+        <p:spPr>
+          <a:xfrm>
+            <a:off x="-1" y="0"/>
+            <a:ext cx="5093209" cy="6858000"/>
+          </a:xfrm>
+          <a:prstGeom prst="rect">
+            <a:avLst/>
+          </a:prstGeom>
+          <a:solidFill>
+            <a:schemeClr val="accent1"/>
+          </a:solidFill>
+          <a:ln>
+            <a:noFill/>
+          </a:ln>
+        </p:spPr>
+        <p:style>
+          <a:lnRef idx="2">
+            <a:schemeClr val="accent1">
+              <a:shade val="50000"/>
+            </a:schemeClr>
+          </a:lnRef>
+          <a:fillRef idx="1">
+            <a:schemeClr val="accent1"/>
+          </a:fillRef>
+          <a:effectRef idx="0">
+            <a:schemeClr val="accent1"/>
+          </a:effectRef>
+          <a:fontRef idx="minor">
+            <a:schemeClr val="lt1"/>
+          </a:fontRef>
+        </p:style>
+        <p:txBody>
+          <a:bodyPr rtlCol="0" anchor="ctr"/>
+          <a:lstStyle/>
+          <a:p>
+            <a:pPr algn="ctr"/>
+            <a:endParaRPr lang="en-US" dirty="0"/>
+          </a:p>
+        </p:txBody>
+      </p:sp>
+      <p:sp>
+        <p:nvSpPr>
+          <p:cNvPr id="2" name="Title 1">
+            <a:extLst>
+              <a:ext uri="{FF2B5EF4-FFF2-40B4-BE49-F238E27FC236}">
+                <a16:creationId xmlns:a16="http://schemas.microsoft.com/office/drawing/2014/main" id="{EFA033F5-4DA7-D248-B89B-E835BC7CA20C}"/>
+              </a:ext>
+            </a:extLst>
+          </p:cNvPr>
+          <p:cNvSpPr>
+            <a:spLocks noGrp="1"/>
+          </p:cNvSpPr>
+          <p:nvPr>
+            <p:ph type="title"/>
+          </p:nvPr>
+        </p:nvSpPr>
+        <p:spPr>
+          <a:xfrm>
+            <a:off x="524741" y="620392"/>
+            <a:ext cx="3808268" cy="5504688"/>
+          </a:xfrm>
+        </p:spPr>
+        <p:txBody>
+          <a:bodyPr vert="horz" lIns="91440" tIns="45720" rIns="91440" bIns="45720" rtlCol="0" anchor="ctr">
+            <a:normAutofit/>
+          </a:bodyPr>
+          <a:lstStyle/>
+          <a:p>
+            <a:pPr algn="ctr"/>
+            <a:r>
+              <a:rPr lang="en-US" sz="5400" kern="1200" dirty="0">
+                <a:solidFill>
+                  <a:schemeClr val="bg1"/>
+                </a:solidFill>
+                <a:latin typeface="+mj-lt"/>
+                <a:ea typeface="+mj-ea"/>
+                <a:cs typeface="+mj-cs"/>
+              </a:rPr>
+              <a:t>Applications </a:t>
+            </a:r>
+            <a:br>
+              <a:rPr lang="en-US" sz="5400" kern="1200" dirty="0">
+                <a:solidFill>
+                  <a:schemeClr val="bg1"/>
+                </a:solidFill>
+                <a:latin typeface="+mj-lt"/>
+                <a:ea typeface="+mj-ea"/>
+                <a:cs typeface="+mj-cs"/>
+              </a:rPr>
+            </a:br>
+            <a:r>
+              <a:rPr lang="en-US" sz="5400" kern="1200" dirty="0">
+                <a:solidFill>
+                  <a:schemeClr val="bg1"/>
+                </a:solidFill>
+                <a:latin typeface="+mj-lt"/>
+                <a:ea typeface="+mj-ea"/>
+                <a:cs typeface="+mj-cs"/>
+              </a:rPr>
+              <a:t> and </a:t>
+            </a:r>
+            <a:br>
+              <a:rPr lang="en-US" sz="5400" kern="1200" dirty="0">
+                <a:solidFill>
+                  <a:schemeClr val="bg1"/>
+                </a:solidFill>
+                <a:latin typeface="+mj-lt"/>
+                <a:ea typeface="+mj-ea"/>
+                <a:cs typeface="+mj-cs"/>
+              </a:rPr>
+            </a:br>
+            <a:r>
+              <a:rPr lang="en-US" sz="5400" kern="1200" dirty="0">
+                <a:solidFill>
+                  <a:schemeClr val="bg1"/>
+                </a:solidFill>
+                <a:latin typeface="+mj-lt"/>
+                <a:ea typeface="+mj-ea"/>
+                <a:cs typeface="+mj-cs"/>
+              </a:rPr>
+              <a:t>Next Steps</a:t>
+            </a:r>
+          </a:p>
+        </p:txBody>
+      </p:sp>
+      <p:graphicFrame>
+        <p:nvGraphicFramePr>
+          <p:cNvPr id="30" name="TextBox 6">
+            <a:extLst>
+              <a:ext uri="{FF2B5EF4-FFF2-40B4-BE49-F238E27FC236}">
+                <a16:creationId xmlns:a16="http://schemas.microsoft.com/office/drawing/2014/main" id="{A78F6E30-E482-4BE9-ACD6-BB5D057DA370}"/>
+              </a:ext>
+            </a:extLst>
+          </p:cNvPr>
+          <p:cNvGraphicFramePr/>
+          <p:nvPr>
+            <p:extLst>
+              <p:ext uri="{D42A27DB-BD31-4B8C-83A1-F6EECF244321}">
+                <p14:modId xmlns:p14="http://schemas.microsoft.com/office/powerpoint/2010/main" val="1991912823"/>
+              </p:ext>
+            </p:extLst>
+          </p:nvPr>
+        </p:nvGraphicFramePr>
+        <p:xfrm>
+          <a:off x="5468389" y="620392"/>
+          <a:ext cx="6263640" cy="5504688"/>
+        </p:xfrm>
+        <a:graphic>
+          <a:graphicData uri="http://schemas.openxmlformats.org/drawingml/2006/diagram">
+            <dgm:relIds xmlns:dgm="http://schemas.openxmlformats.org/drawingml/2006/diagram" xmlns:r="http://schemas.openxmlformats.org/officeDocument/2006/relationships" r:dm="rId2" r:lo="rId3" r:qs="rId4" r:cs="rId5"/>
+          </a:graphicData>
+        </a:graphic>
+      </p:graphicFrame>
+    </p:spTree>
+    <p:extLst>
+      <p:ext uri="{BB962C8B-B14F-4D97-AF65-F5344CB8AC3E}">
+        <p14:creationId xmlns:p14="http://schemas.microsoft.com/office/powerpoint/2010/main" val="1916528368"/>
       </p:ext>
     </p:extLst>
   </p:cSld>
@@ -13299,33 +16224,7 @@
                   <a:schemeClr val="tx2"/>
                 </a:solidFill>
               </a:rPr>
-              <a:t>Newbie to the marathon scene, having completed my first virtual </a:t>
-            </a:r>
-            <a:r>
-              <a:rPr lang="en-US" sz="1600" dirty="0" err="1">
-                <a:solidFill>
-                  <a:schemeClr val="tx2"/>
-                </a:solidFill>
-              </a:rPr>
-              <a:t>StanChart</a:t>
-            </a:r>
-            <a:r>
-              <a:rPr lang="en-US" sz="1600" dirty="0">
-                <a:solidFill>
-                  <a:schemeClr val="tx2"/>
-                </a:solidFill>
-              </a:rPr>
-              <a:t> marathon when the country was locked down during Covid-19 last year. </a:t>
-            </a:r>
-          </a:p>
-          <a:p>
-            <a:r>
-              <a:rPr lang="en-US" sz="1600" dirty="0">
-                <a:solidFill>
-                  <a:schemeClr val="tx2"/>
-                </a:solidFill>
-              </a:rPr>
-              <a:t>Itching to do my first ultramarathon (defined as any run beyond 42.195km) and have prepared a series of posts to ask running veterans for advice. Two popular reddit communities for advanced types of running are </a:t>
+              <a:t>I am a marathon runner who is itching to do my first ultramarathon (defined as any run beyond 42.195km) and have prepared a series of posts to ask running veterans for advice. Two popular reddit communities for advanced types of running are: </a:t>
             </a:r>
             <a:r>
               <a:rPr lang="en-US" sz="1600" i="1" dirty="0">
@@ -14757,49 +17656,129 @@
           <a:p>
             <a:pPr marL="285750" indent="-285750"/>
             <a:r>
-              <a:rPr lang="en-US" sz="1800">
+              <a:rPr lang="en-US" sz="1800" dirty="0">
                 <a:solidFill>
                   <a:schemeClr val="tx2"/>
                 </a:solidFill>
               </a:rPr>
-              <a:t>The author with the highest number of posts on r\Ultramarathon is ultracrockett with 25 posts</a:t>
+              <a:t>The author with the highest on r\</a:t>
+            </a:r>
+            <a:r>
+              <a:rPr lang="en-US" sz="1800" dirty="0" err="1">
+                <a:solidFill>
+                  <a:schemeClr val="tx2"/>
+                </a:solidFill>
+              </a:rPr>
+              <a:t>AdvancedRunning</a:t>
+            </a:r>
+            <a:r>
+              <a:rPr lang="en-US" sz="1800" dirty="0">
+                <a:solidFill>
+                  <a:schemeClr val="tx2"/>
+                </a:solidFill>
+              </a:rPr>
+              <a:t> is </a:t>
+            </a:r>
+            <a:r>
+              <a:rPr lang="en-US" sz="1800" dirty="0" err="1">
+                <a:solidFill>
+                  <a:schemeClr val="tx2"/>
+                </a:solidFill>
+              </a:rPr>
+              <a:t>brwalkernc</a:t>
+            </a:r>
+            <a:r>
+              <a:rPr lang="en-US" sz="1800" dirty="0">
+                <a:solidFill>
+                  <a:schemeClr val="tx2"/>
+                </a:solidFill>
+              </a:rPr>
+              <a:t> with 31 posts</a:t>
             </a:r>
           </a:p>
           <a:p>
             <a:pPr marL="285750" indent="-285750"/>
             <a:r>
-              <a:rPr lang="en-US" sz="1800">
+              <a:rPr lang="en-US" sz="1800" dirty="0">
                 <a:solidFill>
                   <a:schemeClr val="tx2"/>
                 </a:solidFill>
               </a:rPr>
-              <a:t>The author with the highest on r\AdvancedRunning is brwalkernc with 31 posts</a:t>
+              <a:t>The author with the highest number of posts on r\ultrarunning is </a:t>
+            </a:r>
+            <a:r>
+              <a:rPr lang="en-US" sz="1800" dirty="0" err="1">
+                <a:solidFill>
+                  <a:schemeClr val="tx2"/>
+                </a:solidFill>
+              </a:rPr>
+              <a:t>ultracrockett</a:t>
+            </a:r>
+            <a:r>
+              <a:rPr lang="en-US" sz="1800" dirty="0">
+                <a:solidFill>
+                  <a:schemeClr val="tx2"/>
+                </a:solidFill>
+              </a:rPr>
+              <a:t> with 25 posts</a:t>
             </a:r>
           </a:p>
           <a:p>
             <a:pPr marL="285750" indent="-285750"/>
             <a:r>
-              <a:rPr lang="en-US" sz="1800">
+              <a:rPr lang="en-US" sz="1800" dirty="0">
                 <a:solidFill>
                   <a:schemeClr val="tx2"/>
                 </a:solidFill>
               </a:rPr>
-              <a:t>They make up &lt;=3% of their sample sets respectively, so not a big problem</a:t>
+              <a:t>They make up &lt;=3% of their sample sets respectively (2,500 posts scrapped from each subreddit community), so not a big problem</a:t>
             </a:r>
           </a:p>
           <a:p>
             <a:pPr marL="285750" indent="-285750"/>
             <a:r>
-              <a:rPr lang="en-US" sz="1800">
+              <a:rPr lang="en-US" sz="1800" dirty="0">
                 <a:solidFill>
                   <a:schemeClr val="tx2"/>
                 </a:solidFill>
               </a:rPr>
-              <a:t>However, I notice that there is a weird-sounding author called "AutoModerator" on r\AdvancedRunning. Upon further analysis, I found out that it is an AI-bot trying to keep readers interested, so those posts are removed</a:t>
+              <a:t>However, I notice that there is a weird-sounding author called "</a:t>
+            </a:r>
+            <a:r>
+              <a:rPr lang="en-US" sz="1800" dirty="0" err="1">
+                <a:solidFill>
+                  <a:schemeClr val="tx2"/>
+                </a:solidFill>
+              </a:rPr>
+              <a:t>AutoModerator</a:t>
+            </a:r>
+            <a:r>
+              <a:rPr lang="en-US" sz="1800" dirty="0">
+                <a:solidFill>
+                  <a:schemeClr val="tx2"/>
+                </a:solidFill>
+              </a:rPr>
+              <a:t>" on r\</a:t>
+            </a:r>
+            <a:r>
+              <a:rPr lang="en-US" sz="1800" dirty="0" err="1">
+                <a:solidFill>
+                  <a:schemeClr val="tx2"/>
+                </a:solidFill>
+              </a:rPr>
+              <a:t>AdvancedRunning</a:t>
+            </a:r>
+            <a:r>
+              <a:rPr lang="en-US" sz="1800" dirty="0">
+                <a:solidFill>
+                  <a:schemeClr val="tx2"/>
+                </a:solidFill>
+              </a:rPr>
+              <a:t>. Upon further analysis, I found out that it is an AI-bot trying to keep readers interested, so those posts are removed</a:t>
             </a:r>
           </a:p>
           <a:p>
-            <a:endParaRPr lang="en-GB" sz="1800">
+            <a:endParaRPr lang="en-GB" sz="1800" dirty="0">
               <a:solidFill>
                 <a:schemeClr val="tx2"/>
               </a:solidFill>
@@ -21764,13 +24743,16 @@
               </a:rPr>
               <a:t>selftext</a:t>
             </a:r>
-            <a:endParaRPr lang="en-US" sz="1400" dirty="0">
-              <a:solidFill>
-                <a:schemeClr val="bg1">
-                  <a:alpha val="60000"/>
-                </a:schemeClr>
-              </a:solidFill>
-            </a:endParaRPr>
+            <a:r>
+              <a:rPr lang="en-US" sz="1400" dirty="0">
+                <a:solidFill>
+                  <a:schemeClr val="bg1">
+                    <a:alpha val="60000"/>
+                  </a:schemeClr>
+                </a:solidFill>
+              </a:rPr>
+              <a:t>, created 16,840 more words (or 4% more)</a:t>
+            </a:r>
           </a:p>
         </p:txBody>
       </p:sp>
@@ -21886,7 +24868,7 @@
         <p:spPr>
           <a:xfrm>
             <a:off x="989534" y="5568966"/>
-            <a:ext cx="3121504" cy="604208"/>
+            <a:ext cx="3121504" cy="795216"/>
           </a:xfrm>
           <a:prstGeom prst="rect">
             <a:avLst/>
@@ -21919,25 +24901,8 @@
                   </a:schemeClr>
                 </a:solidFill>
               </a:rPr>
-              <a:t>Added title to </a:t>
+              <a:t>Two more rounds of tuning hyperparameters until it is impossible to further improve accuracy scores</a:t>
             </a:r>
-            <a:r>
-              <a:rPr lang="en-US" sz="1400" dirty="0" err="1">
-                <a:solidFill>
-                  <a:schemeClr val="bg1">
-                    <a:alpha val="60000"/>
-                  </a:schemeClr>
-                </a:solidFill>
-              </a:rPr>
-              <a:t>selftext</a:t>
-            </a:r>
-            <a:endParaRPr lang="en-US" sz="1400" dirty="0">
-              <a:solidFill>
-                <a:schemeClr val="bg1">
-                  <a:alpha val="60000"/>
-                </a:schemeClr>
-              </a:solidFill>
-            </a:endParaRPr>
           </a:p>
         </p:txBody>
       </p:sp>
@@ -21959,8 +24924,8 @@
         </p:nvCxnSpPr>
         <p:spPr>
           <a:xfrm>
-            <a:off x="4111038" y="5871070"/>
-            <a:ext cx="1232858" cy="179799"/>
+            <a:off x="4111038" y="5966574"/>
+            <a:ext cx="1232858" cy="84295"/>
           </a:xfrm>
           <a:prstGeom prst="line">
             <a:avLst/>
@@ -22501,15 +25466,23 @@
             </a:pPr>
             <a:r>
               <a:rPr lang="en-US" sz="2000" dirty="0"/>
-              <a:t>My model has an accuracy of 82%. Out of 1233 posts in the test set, it got 1011 correct, i.e. assigning reddit posts to r\</a:t>
+              <a:t>My model has an accuracy of 82%. Out of 1,233 posts in the test set, it got assigned 1,011 correctly [504 + 507]</a:t>
             </a:r>
-            <a:r>
-              <a:rPr lang="en-US" sz="2000" dirty="0" err="1"/>
-              <a:t>AdvancedRunning</a:t>
-            </a:r>
+          </a:p>
+          <a:p>
+            <a:pPr marL="342900" indent="-342900">
+              <a:lnSpc>
+                <a:spcPct val="90000"/>
+              </a:lnSpc>
+              <a:spcAft>
+                <a:spcPts val="600"/>
+              </a:spcAft>
+              <a:buFont typeface="Arial" panose="020B0604020202020204" pitchFamily="34" charset="0"/>
+              <a:buChar char="•"/>
+            </a:pPr>
             <a:r>
               <a:rPr lang="en-US" sz="2000" dirty="0"/>
-              <a:t> and r\ultrarunning correctly. Only 18% of posts are misclassified.</a:t>
+              <a:t>Only 18% of posts are misclassified.</a:t>
             </a:r>
           </a:p>
           <a:p>
@@ -22533,11 +25506,27 @@
             </a:r>
             <a:r>
               <a:rPr lang="en-US" sz="2000" dirty="0"/>
-              <a:t> posts [504 / (504+109)] = 82.2% = specificity, as it is in predicting r\ultrarunning posts [507/(507+113)] = 81.8% = sensitivity </a:t>
+              <a:t> posts [504 / (504+109)] = 82.2% = specificity…</a:t>
+            </a:r>
+          </a:p>
+          <a:p>
+            <a:pPr marL="342900" indent="-342900">
+              <a:lnSpc>
+                <a:spcPct val="90000"/>
+              </a:lnSpc>
+              <a:spcAft>
+                <a:spcPts val="600"/>
+              </a:spcAft>
+              <a:buFont typeface="Arial" panose="020B0604020202020204" pitchFamily="34" charset="0"/>
+              <a:buChar char="•"/>
+            </a:pPr>
+            <a:r>
+              <a:rPr lang="en-US" sz="2000" dirty="0"/>
+              <a:t>as it is in predicting r\ultrarunning posts [507/(507+113)] = 81.8% = sensitivity </a:t>
             </a:r>
             <a:r>
               <a:rPr lang="en-US" sz="1600" i="1" dirty="0"/>
-              <a:t>(I had arbitrarily set r\ultrarunning as "1" and r\</a:t>
+              <a:t>(as I had arbitrarily set r\ultrarunning as "1" and r\</a:t>
             </a:r>
             <a:r>
               <a:rPr lang="en-US" sz="1600" i="1" dirty="0" err="1"/>
@@ -22578,7 +25567,7 @@
         </p:blipFill>
         <p:spPr bwMode="auto">
           <a:xfrm>
-            <a:off x="7863840" y="598634"/>
+            <a:off x="8003540" y="3786334"/>
             <a:ext cx="4014216" cy="2891067"/>
           </a:xfrm>
           <a:prstGeom prst="rect">
@@ -22624,8 +25613,8 @@
         </p:blipFill>
         <p:spPr bwMode="auto">
           <a:xfrm>
-            <a:off x="7992094" y="3831625"/>
-            <a:ext cx="3885962" cy="2574328"/>
+            <a:off x="7774169" y="617757"/>
+            <a:ext cx="4243588" cy="2811244"/>
           </a:xfrm>
           <a:prstGeom prst="rect">
             <a:avLst/>
@@ -24059,7 +27048,7 @@
                   <a:schemeClr val="tx2"/>
                 </a:solidFill>
               </a:rPr>
-              <a:t>For my problem statement, which is to find out where to post my ultra-marathon training questions, it sounds like I should probably post my questions on r\</a:t>
+              <a:t>For my problem statement, which is to find out where to post training questions for my first ultra-marathon , it sounds like I should probably do it on r\</a:t>
             </a:r>
             <a:r>
               <a:rPr lang="en-US" sz="1400" dirty="0" err="1">
@@ -24174,76 +27163,114 @@
       </p:pic>
       <p:sp>
         <p:nvSpPr>
-          <p:cNvPr id="5" name="TextBox 4">
+          <p:cNvPr id="4" name="Cloud 3">
             <a:extLst>
               <a:ext uri="{FF2B5EF4-FFF2-40B4-BE49-F238E27FC236}">
-                <a16:creationId xmlns:a16="http://schemas.microsoft.com/office/drawing/2014/main" id="{AC37C532-3751-C945-8862-E693D56209FF}"/>
+                <a16:creationId xmlns:a16="http://schemas.microsoft.com/office/drawing/2014/main" id="{46009767-739A-1145-A497-492C8F871389}"/>
               </a:ext>
             </a:extLst>
           </p:cNvPr>
-          <p:cNvSpPr txBox="1"/>
+          <p:cNvSpPr/>
           <p:nvPr/>
         </p:nvSpPr>
         <p:spPr>
           <a:xfrm>
-            <a:off x="8542498" y="4793145"/>
-            <a:ext cx="2938211" cy="646331"/>
+            <a:off x="9098841" y="4546601"/>
+            <a:ext cx="2363713" cy="1208448"/>
           </a:xfrm>
-          <a:prstGeom prst="rect">
+          <a:prstGeom prst="cloud">
             <a:avLst/>
           </a:prstGeom>
-          <a:noFill/>
+          <a:solidFill>
+            <a:schemeClr val="accent1">
+              <a:alpha val="70000"/>
+            </a:schemeClr>
+          </a:solidFill>
         </p:spPr>
+        <p:style>
+          <a:lnRef idx="2">
+            <a:schemeClr val="accent1">
+              <a:shade val="50000"/>
+            </a:schemeClr>
+          </a:lnRef>
+          <a:fillRef idx="1">
+            <a:schemeClr val="accent1"/>
+          </a:fillRef>
+          <a:effectRef idx="0">
+            <a:schemeClr val="accent1"/>
+          </a:effectRef>
+          <a:fontRef idx="minor">
+            <a:schemeClr val="lt1"/>
+          </a:fontRef>
+        </p:style>
         <p:txBody>
-          <a:bodyPr wrap="square" rtlCol="0">
-            <a:spAutoFit/>
-          </a:bodyPr>
+          <a:bodyPr rtlCol="0" anchor="ctr"/>
           <a:lstStyle/>
           <a:p>
+            <a:pPr algn="ctr"/>
             <a:r>
-              <a:rPr lang="en-GB" dirty="0"/>
-              <a:t>Predict increased odds of appearing in r\ultrarunning</a:t>
+              <a:rPr lang="en-US" sz="1400" dirty="0"/>
+              <a:t>Increase odds of appearing in r\ultrarunning</a:t>
             </a:r>
           </a:p>
         </p:txBody>
       </p:sp>
       <p:sp>
         <p:nvSpPr>
-          <p:cNvPr id="22" name="TextBox 21">
+          <p:cNvPr id="16" name="Cloud 15">
             <a:extLst>
               <a:ext uri="{FF2B5EF4-FFF2-40B4-BE49-F238E27FC236}">
-                <a16:creationId xmlns:a16="http://schemas.microsoft.com/office/drawing/2014/main" id="{6F231BE9-796E-3245-82E6-70DB03F9A8BC}"/>
+                <a16:creationId xmlns:a16="http://schemas.microsoft.com/office/drawing/2014/main" id="{14AB6191-F5F6-744B-A653-8E5C6BFA63F5}"/>
               </a:ext>
             </a:extLst>
           </p:cNvPr>
-          <p:cNvSpPr txBox="1"/>
+          <p:cNvSpPr/>
           <p:nvPr/>
         </p:nvSpPr>
         <p:spPr>
           <a:xfrm>
-            <a:off x="1234010" y="3752202"/>
-            <a:ext cx="2748206" cy="923330"/>
+            <a:off x="1273856" y="3779575"/>
+            <a:ext cx="2363713" cy="1207008"/>
           </a:xfrm>
-          <a:prstGeom prst="rect">
+          <a:prstGeom prst="cloud">
             <a:avLst/>
           </a:prstGeom>
-          <a:noFill/>
+          <a:solidFill>
+            <a:schemeClr val="accent1">
+              <a:alpha val="70000"/>
+            </a:schemeClr>
+          </a:solidFill>
         </p:spPr>
+        <p:style>
+          <a:lnRef idx="2">
+            <a:schemeClr val="accent1">
+              <a:shade val="50000"/>
+            </a:schemeClr>
+          </a:lnRef>
+          <a:fillRef idx="1">
+            <a:schemeClr val="accent1"/>
+          </a:fillRef>
+          <a:effectRef idx="0">
+            <a:schemeClr val="accent1"/>
+          </a:effectRef>
+          <a:fontRef idx="minor">
+            <a:schemeClr val="lt1"/>
+          </a:fontRef>
+        </p:style>
         <p:txBody>
-          <a:bodyPr wrap="square" rtlCol="0">
-            <a:spAutoFit/>
-          </a:bodyPr>
+          <a:bodyPr rtlCol="0" anchor="ctr"/>
           <a:lstStyle/>
           <a:p>
+            <a:pPr algn="ctr"/>
             <a:r>
-              <a:rPr lang="en-GB" dirty="0"/>
-              <a:t>Predict increased odds of appearing in r\</a:t>
+              <a:rPr lang="en-US" sz="1400" dirty="0"/>
+              <a:t>Increase odds of appearing in r\</a:t>
             </a:r>
             <a:r>
-              <a:rPr lang="en-GB" dirty="0" err="1"/>
-              <a:t>AdvancedRunning</a:t>
+              <a:rPr lang="en-US" sz="1400" dirty="0" err="1"/>
+              <a:t>AdvanceRunning</a:t>
             </a:r>
-            <a:endParaRPr lang="en-GB" dirty="0"/>
+            <a:endParaRPr lang="en-US" sz="1400" dirty="0"/>
           </a:p>
         </p:txBody>
       </p:sp>

</xml_diff>